<commit_message>
equations removed from figures
</commit_message>
<xml_diff>
--- a/slides/mlps/templates/singlelay_1.pptx
+++ b/slides/mlps/templates/singlelay_1.pptx
@@ -107,6 +107,11 @@
       </a:defRPr>
     </a:lvl9pPr>
   </p:defaultTextStyle>
+  <p:extLst>
+    <p:ext uri="{EFAFB233-063F-42B5-8137-9DF3F51BA10A}">
+      <p15:sldGuideLst xmlns:p15="http://schemas.microsoft.com/office/powerpoint/2012/main"/>
+    </p:ext>
+  </p:extLst>
 </p:presentation>
 </file>
 
@@ -192,7 +197,7 @@
           <a:p>
             <a:fld id="{1AEF392E-2238-9548-B824-FD99E5BDE0D7}" type="datetimeFigureOut">
               <a:rPr lang="en-DE" smtClean="0"/>
-              <a:t>17.01.21</a:t>
+              <a:t>05.03.21</a:t>
             </a:fld>
             <a:endParaRPr lang="en-DE"/>
           </a:p>
@@ -718,7 +723,7 @@
           <a:p>
             <a:fld id="{C394300E-6B40-8442-A0E0-456B8A30F696}" type="datetimeFigureOut">
               <a:rPr lang="en-DE" smtClean="0"/>
-              <a:t>17.01.21</a:t>
+              <a:t>05.03.21</a:t>
             </a:fld>
             <a:endParaRPr lang="en-DE"/>
           </a:p>
@@ -918,7 +923,7 @@
           <a:p>
             <a:fld id="{C394300E-6B40-8442-A0E0-456B8A30F696}" type="datetimeFigureOut">
               <a:rPr lang="en-DE" smtClean="0"/>
-              <a:t>17.01.21</a:t>
+              <a:t>05.03.21</a:t>
             </a:fld>
             <a:endParaRPr lang="en-DE"/>
           </a:p>
@@ -1128,7 +1133,7 @@
           <a:p>
             <a:fld id="{C394300E-6B40-8442-A0E0-456B8A30F696}" type="datetimeFigureOut">
               <a:rPr lang="en-DE" smtClean="0"/>
-              <a:t>17.01.21</a:t>
+              <a:t>05.03.21</a:t>
             </a:fld>
             <a:endParaRPr lang="en-DE"/>
           </a:p>
@@ -1687,7 +1692,7 @@
           <a:p>
             <a:fld id="{C394300E-6B40-8442-A0E0-456B8A30F696}" type="datetimeFigureOut">
               <a:rPr lang="en-DE" smtClean="0"/>
-              <a:t>17.01.21</a:t>
+              <a:t>05.03.21</a:t>
             </a:fld>
             <a:endParaRPr lang="en-DE"/>
           </a:p>
@@ -1963,7 +1968,7 @@
           <a:p>
             <a:fld id="{C394300E-6B40-8442-A0E0-456B8A30F696}" type="datetimeFigureOut">
               <a:rPr lang="en-DE" smtClean="0"/>
-              <a:t>17.01.21</a:t>
+              <a:t>05.03.21</a:t>
             </a:fld>
             <a:endParaRPr lang="en-DE"/>
           </a:p>
@@ -2231,7 +2236,7 @@
           <a:p>
             <a:fld id="{C394300E-6B40-8442-A0E0-456B8A30F696}" type="datetimeFigureOut">
               <a:rPr lang="en-DE" smtClean="0"/>
-              <a:t>17.01.21</a:t>
+              <a:t>05.03.21</a:t>
             </a:fld>
             <a:endParaRPr lang="en-DE"/>
           </a:p>
@@ -2646,7 +2651,7 @@
           <a:p>
             <a:fld id="{C394300E-6B40-8442-A0E0-456B8A30F696}" type="datetimeFigureOut">
               <a:rPr lang="en-DE" smtClean="0"/>
-              <a:t>17.01.21</a:t>
+              <a:t>05.03.21</a:t>
             </a:fld>
             <a:endParaRPr lang="en-DE"/>
           </a:p>
@@ -2788,7 +2793,7 @@
           <a:p>
             <a:fld id="{C394300E-6B40-8442-A0E0-456B8A30F696}" type="datetimeFigureOut">
               <a:rPr lang="en-DE" smtClean="0"/>
-              <a:t>17.01.21</a:t>
+              <a:t>05.03.21</a:t>
             </a:fld>
             <a:endParaRPr lang="en-DE"/>
           </a:p>
@@ -2901,7 +2906,7 @@
           <a:p>
             <a:fld id="{C394300E-6B40-8442-A0E0-456B8A30F696}" type="datetimeFigureOut">
               <a:rPr lang="en-DE" smtClean="0"/>
-              <a:t>17.01.21</a:t>
+              <a:t>05.03.21</a:t>
             </a:fld>
             <a:endParaRPr lang="en-DE"/>
           </a:p>
@@ -3214,7 +3219,7 @@
           <a:p>
             <a:fld id="{C394300E-6B40-8442-A0E0-456B8A30F696}" type="datetimeFigureOut">
               <a:rPr lang="en-DE" smtClean="0"/>
-              <a:t>17.01.21</a:t>
+              <a:t>05.03.21</a:t>
             </a:fld>
             <a:endParaRPr lang="en-DE"/>
           </a:p>
@@ -3503,7 +3508,7 @@
           <a:p>
             <a:fld id="{C394300E-6B40-8442-A0E0-456B8A30F696}" type="datetimeFigureOut">
               <a:rPr lang="en-DE" smtClean="0"/>
-              <a:t>17.01.21</a:t>
+              <a:t>05.03.21</a:t>
             </a:fld>
             <a:endParaRPr lang="en-DE"/>
           </a:p>
@@ -3746,7 +3751,7 @@
           <a:p>
             <a:fld id="{C394300E-6B40-8442-A0E0-456B8A30F696}" type="datetimeFigureOut">
               <a:rPr lang="en-DE" smtClean="0"/>
-              <a:t>17.01.21</a:t>
+              <a:t>05.03.21</a:t>
             </a:fld>
             <a:endParaRPr lang="en-DE"/>
           </a:p>
@@ -4166,10 +4171,10 @@
       </p:grpSpPr>
       <p:grpSp>
         <p:nvGrpSpPr>
-          <p:cNvPr id="11" name="Group 10">
-            <a:extLst>
-              <a:ext uri="{FF2B5EF4-FFF2-40B4-BE49-F238E27FC236}">
-                <a16:creationId xmlns:a16="http://schemas.microsoft.com/office/drawing/2014/main" id="{95469078-9773-4C45-8DDF-F6E3971E5871}"/>
+          <p:cNvPr id="9" name="Group 8">
+            <a:extLst>
+              <a:ext uri="{FF2B5EF4-FFF2-40B4-BE49-F238E27FC236}">
+                <a16:creationId xmlns:a16="http://schemas.microsoft.com/office/drawing/2014/main" id="{050808D4-1AE8-CC42-B1B8-ABA5F83B7D1F}"/>
               </a:ext>
             </a:extLst>
           </p:cNvPr>
@@ -4179,47 +4184,137 @@
         <p:grpSpPr>
           <a:xfrm>
             <a:off x="2558401" y="585601"/>
-            <a:ext cx="7071067" cy="5673569"/>
-            <a:chOff x="1918800" y="439200"/>
-            <a:chExt cx="5303300" cy="4255177"/>
+            <a:ext cx="7071067" cy="4521460"/>
+            <a:chOff x="1920350" y="995560"/>
+            <a:chExt cx="5303300" cy="3391095"/>
           </a:xfrm>
         </p:grpSpPr>
+        <p:sp>
+          <p:nvSpPr>
+            <p:cNvPr id="137" name="Google Shape;137;p16"/>
+            <p:cNvSpPr/>
+            <p:nvPr/>
+          </p:nvSpPr>
+          <p:spPr>
+            <a:xfrm>
+              <a:off x="2050850" y="2007344"/>
+              <a:ext cx="600600" cy="600600"/>
+            </a:xfrm>
+            <a:prstGeom prst="ellipse">
+              <a:avLst/>
+            </a:prstGeom>
+            <a:solidFill>
+              <a:srgbClr val="ECCC24"/>
+            </a:solidFill>
+            <a:ln>
+              <a:noFill/>
+            </a:ln>
+          </p:spPr>
+          <p:txBody>
+            <a:bodyPr spcFirstLastPara="1" wrap="square" lIns="121900" tIns="121900" rIns="121900" bIns="121900" anchor="ctr" anchorCtr="0">
+              <a:noAutofit/>
+            </a:bodyPr>
+            <a:lstStyle/>
+            <a:p>
+              <a:endParaRPr sz="2400"/>
+            </a:p>
+          </p:txBody>
+        </p:sp>
+        <p:sp>
+          <p:nvSpPr>
+            <p:cNvPr id="138" name="Google Shape;138;p16"/>
+            <p:cNvSpPr/>
+            <p:nvPr/>
+          </p:nvSpPr>
+          <p:spPr>
+            <a:xfrm>
+              <a:off x="2050850" y="2725844"/>
+              <a:ext cx="600600" cy="600600"/>
+            </a:xfrm>
+            <a:prstGeom prst="ellipse">
+              <a:avLst/>
+            </a:prstGeom>
+            <a:solidFill>
+              <a:srgbClr val="ECCC24"/>
+            </a:solidFill>
+            <a:ln>
+              <a:noFill/>
+            </a:ln>
+          </p:spPr>
+          <p:txBody>
+            <a:bodyPr spcFirstLastPara="1" wrap="square" lIns="121900" tIns="121900" rIns="121900" bIns="121900" anchor="ctr" anchorCtr="0">
+              <a:noAutofit/>
+            </a:bodyPr>
+            <a:lstStyle/>
+            <a:p>
+              <a:endParaRPr sz="2400" dirty="0"/>
+            </a:p>
+          </p:txBody>
+        </p:sp>
+        <p:sp>
+          <p:nvSpPr>
+            <p:cNvPr id="139" name="Google Shape;139;p16"/>
+            <p:cNvSpPr/>
+            <p:nvPr/>
+          </p:nvSpPr>
+          <p:spPr>
+            <a:xfrm>
+              <a:off x="2050850" y="3444344"/>
+              <a:ext cx="600600" cy="600600"/>
+            </a:xfrm>
+            <a:prstGeom prst="ellipse">
+              <a:avLst/>
+            </a:prstGeom>
+            <a:solidFill>
+              <a:srgbClr val="ECCC24"/>
+            </a:solidFill>
+            <a:ln>
+              <a:noFill/>
+            </a:ln>
+          </p:spPr>
+          <p:txBody>
+            <a:bodyPr spcFirstLastPara="1" wrap="square" lIns="121900" tIns="121900" rIns="121900" bIns="121900" anchor="ctr" anchorCtr="0">
+              <a:noAutofit/>
+            </a:bodyPr>
+            <a:lstStyle/>
+            <a:p>
+              <a:endParaRPr sz="2400"/>
+            </a:p>
+          </p:txBody>
+        </p:sp>
         <p:grpSp>
           <p:nvGrpSpPr>
-            <p:cNvPr id="9" name="Group 8">
-              <a:extLst>
-                <a:ext uri="{FF2B5EF4-FFF2-40B4-BE49-F238E27FC236}">
-                  <a16:creationId xmlns:a16="http://schemas.microsoft.com/office/drawing/2014/main" id="{050808D4-1AE8-CC42-B1B8-ABA5F83B7D1F}"/>
-                </a:ext>
-              </a:extLst>
-            </p:cNvPr>
+            <p:cNvPr id="140" name="Google Shape;140;p16"/>
             <p:cNvGrpSpPr/>
             <p:nvPr/>
           </p:nvGrpSpPr>
           <p:grpSpPr>
             <a:xfrm>
-              <a:off x="1918800" y="439200"/>
-              <a:ext cx="5303300" cy="3391095"/>
-              <a:chOff x="1920350" y="995560"/>
-              <a:chExt cx="5303300" cy="3391095"/>
+              <a:off x="4273431" y="1556701"/>
+              <a:ext cx="600569" cy="600579"/>
+              <a:chOff x="4861200" y="959925"/>
+              <a:chExt cx="689200" cy="688500"/>
             </a:xfrm>
           </p:grpSpPr>
           <p:sp>
             <p:nvSpPr>
-              <p:cNvPr id="137" name="Google Shape;137;p16"/>
+              <p:cNvPr id="141" name="Google Shape;141;p16"/>
               <p:cNvSpPr/>
               <p:nvPr/>
             </p:nvSpPr>
             <p:spPr>
               <a:xfrm>
-                <a:off x="2050850" y="2007344"/>
-                <a:ext cx="600600" cy="600600"/>
+                <a:off x="4861200" y="959925"/>
+                <a:ext cx="689100" cy="688500"/>
               </a:xfrm>
-              <a:prstGeom prst="ellipse">
-                <a:avLst/>
+              <a:prstGeom prst="pie">
+                <a:avLst>
+                  <a:gd name="adj1" fmla="val 5396744"/>
+                  <a:gd name="adj2" fmla="val 16200000"/>
+                </a:avLst>
               </a:prstGeom>
               <a:solidFill>
-                <a:srgbClr val="ECCC24"/>
+                <a:srgbClr val="A2C4C9"/>
               </a:solidFill>
               <a:ln>
                 <a:noFill/>
@@ -4237,51 +4332,23 @@
           </p:sp>
           <p:sp>
             <p:nvSpPr>
-              <p:cNvPr id="138" name="Google Shape;138;p16"/>
+              <p:cNvPr id="142" name="Google Shape;142;p16"/>
               <p:cNvSpPr/>
               <p:nvPr/>
             </p:nvSpPr>
             <p:spPr>
-              <a:xfrm>
-                <a:off x="2050850" y="2725844"/>
-                <a:ext cx="600600" cy="600600"/>
+              <a:xfrm rot="10800000">
+                <a:off x="4861300" y="959925"/>
+                <a:ext cx="689100" cy="688500"/>
               </a:xfrm>
-              <a:prstGeom prst="ellipse">
-                <a:avLst/>
+              <a:prstGeom prst="pie">
+                <a:avLst>
+                  <a:gd name="adj1" fmla="val 5396744"/>
+                  <a:gd name="adj2" fmla="val 16200000"/>
+                </a:avLst>
               </a:prstGeom>
               <a:solidFill>
-                <a:srgbClr val="ECCC24"/>
-              </a:solidFill>
-              <a:ln>
-                <a:noFill/>
-              </a:ln>
-            </p:spPr>
-            <p:txBody>
-              <a:bodyPr spcFirstLastPara="1" wrap="square" lIns="121900" tIns="121900" rIns="121900" bIns="121900" anchor="ctr" anchorCtr="0">
-                <a:noAutofit/>
-              </a:bodyPr>
-              <a:lstStyle/>
-              <a:p>
-                <a:endParaRPr sz="2400" dirty="0"/>
-              </a:p>
-            </p:txBody>
-          </p:sp>
-          <p:sp>
-            <p:nvSpPr>
-              <p:cNvPr id="139" name="Google Shape;139;p16"/>
-              <p:cNvSpPr/>
-              <p:nvPr/>
-            </p:nvSpPr>
-            <p:spPr>
-              <a:xfrm>
-                <a:off x="2050850" y="3444344"/>
-                <a:ext cx="600600" cy="600600"/>
-              </a:xfrm>
-              <a:prstGeom prst="ellipse">
-                <a:avLst/>
-              </a:prstGeom>
-              <a:solidFill>
-                <a:srgbClr val="ECCC24"/>
+                <a:srgbClr val="45818E"/>
               </a:solidFill>
               <a:ln>
                 <a:noFill/>
@@ -4297,1418 +4364,809 @@
               </a:p>
             </p:txBody>
           </p:sp>
-          <p:grpSp>
-            <p:nvGrpSpPr>
-              <p:cNvPr id="140" name="Google Shape;140;p16"/>
-              <p:cNvGrpSpPr/>
-              <p:nvPr/>
-            </p:nvGrpSpPr>
-            <p:grpSpPr>
-              <a:xfrm>
-                <a:off x="4273431" y="1556701"/>
-                <a:ext cx="600569" cy="600579"/>
-                <a:chOff x="4861200" y="959925"/>
-                <a:chExt cx="689200" cy="688500"/>
-              </a:xfrm>
-            </p:grpSpPr>
-            <p:sp>
-              <p:nvSpPr>
-                <p:cNvPr id="141" name="Google Shape;141;p16"/>
-                <p:cNvSpPr/>
-                <p:nvPr/>
-              </p:nvSpPr>
-              <p:spPr>
-                <a:xfrm>
-                  <a:off x="4861200" y="959925"/>
-                  <a:ext cx="689100" cy="688500"/>
-                </a:xfrm>
-                <a:prstGeom prst="pie">
-                  <a:avLst>
-                    <a:gd name="adj1" fmla="val 5396744"/>
-                    <a:gd name="adj2" fmla="val 16200000"/>
-                  </a:avLst>
-                </a:prstGeom>
-                <a:solidFill>
-                  <a:srgbClr val="A2C4C9"/>
-                </a:solidFill>
-                <a:ln>
-                  <a:noFill/>
-                </a:ln>
-              </p:spPr>
-              <p:txBody>
-                <a:bodyPr spcFirstLastPara="1" wrap="square" lIns="121900" tIns="121900" rIns="121900" bIns="121900" anchor="ctr" anchorCtr="0">
-                  <a:noAutofit/>
-                </a:bodyPr>
-                <a:lstStyle/>
-                <a:p>
-                  <a:endParaRPr sz="2400"/>
-                </a:p>
-              </p:txBody>
-            </p:sp>
-            <p:sp>
-              <p:nvSpPr>
-                <p:cNvPr id="142" name="Google Shape;142;p16"/>
-                <p:cNvSpPr/>
-                <p:nvPr/>
-              </p:nvSpPr>
-              <p:spPr>
-                <a:xfrm rot="10800000">
-                  <a:off x="4861300" y="959925"/>
-                  <a:ext cx="689100" cy="688500"/>
-                </a:xfrm>
-                <a:prstGeom prst="pie">
-                  <a:avLst>
-                    <a:gd name="adj1" fmla="val 5396744"/>
-                    <a:gd name="adj2" fmla="val 16200000"/>
-                  </a:avLst>
-                </a:prstGeom>
-                <a:solidFill>
-                  <a:srgbClr val="45818E"/>
-                </a:solidFill>
-                <a:ln>
-                  <a:noFill/>
-                </a:ln>
-              </p:spPr>
-              <p:txBody>
-                <a:bodyPr spcFirstLastPara="1" wrap="square" lIns="121900" tIns="121900" rIns="121900" bIns="121900" anchor="ctr" anchorCtr="0">
-                  <a:noAutofit/>
-                </a:bodyPr>
-                <a:lstStyle/>
-                <a:p>
-                  <a:endParaRPr sz="2400"/>
-                </a:p>
-              </p:txBody>
-            </p:sp>
-          </p:grpSp>
-          <p:grpSp>
-            <p:nvGrpSpPr>
-              <p:cNvPr id="143" name="Google Shape;143;p16"/>
-              <p:cNvGrpSpPr/>
-              <p:nvPr/>
-            </p:nvGrpSpPr>
-            <p:grpSpPr>
-              <a:xfrm>
-                <a:off x="4273431" y="2299826"/>
-                <a:ext cx="600569" cy="600579"/>
-                <a:chOff x="4861200" y="959925"/>
-                <a:chExt cx="689200" cy="688500"/>
-              </a:xfrm>
-            </p:grpSpPr>
-            <p:sp>
-              <p:nvSpPr>
-                <p:cNvPr id="144" name="Google Shape;144;p16"/>
-                <p:cNvSpPr/>
-                <p:nvPr/>
-              </p:nvSpPr>
-              <p:spPr>
-                <a:xfrm>
-                  <a:off x="4861200" y="959925"/>
-                  <a:ext cx="689100" cy="688500"/>
-                </a:xfrm>
-                <a:prstGeom prst="pie">
-                  <a:avLst>
-                    <a:gd name="adj1" fmla="val 5396744"/>
-                    <a:gd name="adj2" fmla="val 16200000"/>
-                  </a:avLst>
-                </a:prstGeom>
-                <a:solidFill>
-                  <a:srgbClr val="A2C4C9"/>
-                </a:solidFill>
-                <a:ln>
-                  <a:noFill/>
-                </a:ln>
-              </p:spPr>
-              <p:txBody>
-                <a:bodyPr spcFirstLastPara="1" wrap="square" lIns="121900" tIns="121900" rIns="121900" bIns="121900" anchor="ctr" anchorCtr="0">
-                  <a:noAutofit/>
-                </a:bodyPr>
-                <a:lstStyle/>
-                <a:p>
-                  <a:endParaRPr sz="2400"/>
-                </a:p>
-              </p:txBody>
-            </p:sp>
-            <p:sp>
-              <p:nvSpPr>
-                <p:cNvPr id="145" name="Google Shape;145;p16"/>
-                <p:cNvSpPr/>
-                <p:nvPr/>
-              </p:nvSpPr>
-              <p:spPr>
-                <a:xfrm rot="10800000">
-                  <a:off x="4861300" y="959925"/>
-                  <a:ext cx="689100" cy="688500"/>
-                </a:xfrm>
-                <a:prstGeom prst="pie">
-                  <a:avLst>
-                    <a:gd name="adj1" fmla="val 5396744"/>
-                    <a:gd name="adj2" fmla="val 16200000"/>
-                  </a:avLst>
-                </a:prstGeom>
-                <a:solidFill>
-                  <a:srgbClr val="45818E"/>
-                </a:solidFill>
-                <a:ln>
-                  <a:noFill/>
-                </a:ln>
-              </p:spPr>
-              <p:txBody>
-                <a:bodyPr spcFirstLastPara="1" wrap="square" lIns="121900" tIns="121900" rIns="121900" bIns="121900" anchor="ctr" anchorCtr="0">
-                  <a:noAutofit/>
-                </a:bodyPr>
-                <a:lstStyle/>
-                <a:p>
-                  <a:endParaRPr sz="2400"/>
-                </a:p>
-              </p:txBody>
-            </p:sp>
-          </p:grpSp>
-          <p:grpSp>
-            <p:nvGrpSpPr>
-              <p:cNvPr id="146" name="Google Shape;146;p16"/>
-              <p:cNvGrpSpPr/>
-              <p:nvPr/>
-            </p:nvGrpSpPr>
-            <p:grpSpPr>
-              <a:xfrm>
-                <a:off x="4273431" y="3042951"/>
-                <a:ext cx="600569" cy="600579"/>
-                <a:chOff x="4861200" y="959925"/>
-                <a:chExt cx="689200" cy="688500"/>
-              </a:xfrm>
-            </p:grpSpPr>
-            <p:sp>
-              <p:nvSpPr>
-                <p:cNvPr id="147" name="Google Shape;147;p16"/>
-                <p:cNvSpPr/>
-                <p:nvPr/>
-              </p:nvSpPr>
-              <p:spPr>
-                <a:xfrm>
-                  <a:off x="4861200" y="959925"/>
-                  <a:ext cx="689100" cy="688500"/>
-                </a:xfrm>
-                <a:prstGeom prst="pie">
-                  <a:avLst>
-                    <a:gd name="adj1" fmla="val 5396744"/>
-                    <a:gd name="adj2" fmla="val 16200000"/>
-                  </a:avLst>
-                </a:prstGeom>
-                <a:solidFill>
-                  <a:srgbClr val="A2C4C9"/>
-                </a:solidFill>
-                <a:ln>
-                  <a:noFill/>
-                </a:ln>
-              </p:spPr>
-              <p:txBody>
-                <a:bodyPr spcFirstLastPara="1" wrap="square" lIns="121900" tIns="121900" rIns="121900" bIns="121900" anchor="ctr" anchorCtr="0">
-                  <a:noAutofit/>
-                </a:bodyPr>
-                <a:lstStyle/>
-                <a:p>
-                  <a:endParaRPr sz="2400"/>
-                </a:p>
-              </p:txBody>
-            </p:sp>
-            <p:sp>
-              <p:nvSpPr>
-                <p:cNvPr id="148" name="Google Shape;148;p16"/>
-                <p:cNvSpPr/>
-                <p:nvPr/>
-              </p:nvSpPr>
-              <p:spPr>
-                <a:xfrm rot="10800000">
-                  <a:off x="4861300" y="959925"/>
-                  <a:ext cx="689100" cy="688500"/>
-                </a:xfrm>
-                <a:prstGeom prst="pie">
-                  <a:avLst>
-                    <a:gd name="adj1" fmla="val 5396744"/>
-                    <a:gd name="adj2" fmla="val 16200000"/>
-                  </a:avLst>
-                </a:prstGeom>
-                <a:solidFill>
-                  <a:srgbClr val="45818E"/>
-                </a:solidFill>
-                <a:ln>
-                  <a:noFill/>
-                </a:ln>
-              </p:spPr>
-              <p:txBody>
-                <a:bodyPr spcFirstLastPara="1" wrap="square" lIns="121900" tIns="121900" rIns="121900" bIns="121900" anchor="ctr" anchorCtr="0">
-                  <a:noAutofit/>
-                </a:bodyPr>
-                <a:lstStyle/>
-                <a:p>
-                  <a:endParaRPr sz="2400"/>
-                </a:p>
-              </p:txBody>
-            </p:sp>
-          </p:grpSp>
-          <p:grpSp>
-            <p:nvGrpSpPr>
-              <p:cNvPr id="149" name="Google Shape;149;p16"/>
-              <p:cNvGrpSpPr/>
-              <p:nvPr/>
-            </p:nvGrpSpPr>
-            <p:grpSpPr>
-              <a:xfrm>
-                <a:off x="4273431" y="3786076"/>
-                <a:ext cx="600569" cy="600579"/>
-                <a:chOff x="4861200" y="959925"/>
-                <a:chExt cx="689200" cy="688500"/>
-              </a:xfrm>
-            </p:grpSpPr>
-            <p:sp>
-              <p:nvSpPr>
-                <p:cNvPr id="150" name="Google Shape;150;p16"/>
-                <p:cNvSpPr/>
-                <p:nvPr/>
-              </p:nvSpPr>
-              <p:spPr>
-                <a:xfrm>
-                  <a:off x="4861200" y="959925"/>
-                  <a:ext cx="689100" cy="688500"/>
-                </a:xfrm>
-                <a:prstGeom prst="pie">
-                  <a:avLst>
-                    <a:gd name="adj1" fmla="val 5396744"/>
-                    <a:gd name="adj2" fmla="val 16200000"/>
-                  </a:avLst>
-                </a:prstGeom>
-                <a:solidFill>
-                  <a:srgbClr val="A2C4C9"/>
-                </a:solidFill>
-                <a:ln>
-                  <a:noFill/>
-                </a:ln>
-              </p:spPr>
-              <p:txBody>
-                <a:bodyPr spcFirstLastPara="1" wrap="square" lIns="121900" tIns="121900" rIns="121900" bIns="121900" anchor="ctr" anchorCtr="0">
-                  <a:noAutofit/>
-                </a:bodyPr>
-                <a:lstStyle/>
-                <a:p>
-                  <a:endParaRPr sz="2400"/>
-                </a:p>
-              </p:txBody>
-            </p:sp>
-            <p:sp>
-              <p:nvSpPr>
-                <p:cNvPr id="151" name="Google Shape;151;p16"/>
-                <p:cNvSpPr/>
-                <p:nvPr/>
-              </p:nvSpPr>
-              <p:spPr>
-                <a:xfrm rot="10800000">
-                  <a:off x="4861300" y="959925"/>
-                  <a:ext cx="689100" cy="688500"/>
-                </a:xfrm>
-                <a:prstGeom prst="pie">
-                  <a:avLst>
-                    <a:gd name="adj1" fmla="val 5396744"/>
-                    <a:gd name="adj2" fmla="val 16200000"/>
-                  </a:avLst>
-                </a:prstGeom>
-                <a:solidFill>
-                  <a:srgbClr val="45818E"/>
-                </a:solidFill>
-                <a:ln>
-                  <a:noFill/>
-                </a:ln>
-              </p:spPr>
-              <p:txBody>
-                <a:bodyPr spcFirstLastPara="1" wrap="square" lIns="121900" tIns="121900" rIns="121900" bIns="121900" anchor="ctr" anchorCtr="0">
-                  <a:noAutofit/>
-                </a:bodyPr>
-                <a:lstStyle/>
-                <a:p>
-                  <a:endParaRPr sz="2400"/>
-                </a:p>
-              </p:txBody>
-            </p:sp>
-          </p:grpSp>
-          <p:grpSp>
-            <p:nvGrpSpPr>
-              <p:cNvPr id="152" name="Google Shape;152;p16"/>
-              <p:cNvGrpSpPr/>
-              <p:nvPr/>
-            </p:nvGrpSpPr>
-            <p:grpSpPr>
-              <a:xfrm>
-                <a:off x="6424781" y="2725863"/>
-                <a:ext cx="600569" cy="600579"/>
-                <a:chOff x="4861200" y="959925"/>
-                <a:chExt cx="689200" cy="688500"/>
-              </a:xfrm>
-            </p:grpSpPr>
-            <p:sp>
-              <p:nvSpPr>
-                <p:cNvPr id="153" name="Google Shape;153;p16"/>
-                <p:cNvSpPr/>
-                <p:nvPr/>
-              </p:nvSpPr>
-              <p:spPr>
-                <a:xfrm>
-                  <a:off x="4861200" y="959925"/>
-                  <a:ext cx="689100" cy="688500"/>
-                </a:xfrm>
-                <a:prstGeom prst="pie">
-                  <a:avLst>
-                    <a:gd name="adj1" fmla="val 5396744"/>
-                    <a:gd name="adj2" fmla="val 16200000"/>
-                  </a:avLst>
-                </a:prstGeom>
-                <a:solidFill>
-                  <a:srgbClr val="B6D7A8"/>
-                </a:solidFill>
-                <a:ln>
-                  <a:noFill/>
-                </a:ln>
-              </p:spPr>
-              <p:txBody>
-                <a:bodyPr spcFirstLastPara="1" wrap="square" lIns="121900" tIns="121900" rIns="121900" bIns="121900" anchor="ctr" anchorCtr="0">
-                  <a:noAutofit/>
-                </a:bodyPr>
-                <a:lstStyle/>
-                <a:p>
-                  <a:endParaRPr sz="2400"/>
-                </a:p>
-              </p:txBody>
-            </p:sp>
-            <p:sp>
-              <p:nvSpPr>
-                <p:cNvPr id="154" name="Google Shape;154;p16"/>
-                <p:cNvSpPr/>
-                <p:nvPr/>
-              </p:nvSpPr>
-              <p:spPr>
-                <a:xfrm rot="10800000">
-                  <a:off x="4861300" y="959925"/>
-                  <a:ext cx="689100" cy="688500"/>
-                </a:xfrm>
-                <a:prstGeom prst="pie">
-                  <a:avLst>
-                    <a:gd name="adj1" fmla="val 5396744"/>
-                    <a:gd name="adj2" fmla="val 16200000"/>
-                  </a:avLst>
-                </a:prstGeom>
-                <a:solidFill>
-                  <a:srgbClr val="6AA84F"/>
-                </a:solidFill>
-                <a:ln>
-                  <a:noFill/>
-                </a:ln>
-              </p:spPr>
-              <p:txBody>
-                <a:bodyPr spcFirstLastPara="1" wrap="square" lIns="121900" tIns="121900" rIns="121900" bIns="121900" anchor="ctr" anchorCtr="0">
-                  <a:noAutofit/>
-                </a:bodyPr>
-                <a:lstStyle/>
-                <a:p>
-                  <a:endParaRPr sz="2400"/>
-                </a:p>
-              </p:txBody>
-            </p:sp>
-          </p:grpSp>
-          <p:cxnSp>
-            <p:nvCxnSpPr>
-              <p:cNvPr id="155" name="Google Shape;155;p16"/>
-              <p:cNvCxnSpPr>
-                <a:stCxn id="137" idx="6"/>
-                <a:endCxn id="141" idx="2"/>
-              </p:cNvCxnSpPr>
-              <p:nvPr/>
-            </p:nvCxnSpPr>
-            <p:spPr>
-              <a:xfrm rot="10800000" flipH="1">
-                <a:off x="2651450" y="1857044"/>
-                <a:ext cx="1622100" cy="450600"/>
-              </a:xfrm>
-              <a:prstGeom prst="straightConnector1">
-                <a:avLst/>
-              </a:prstGeom>
-              <a:noFill/>
-              <a:ln w="19050" cap="flat" cmpd="sng">
-                <a:solidFill>
-                  <a:schemeClr val="tx1"/>
-                </a:solidFill>
-                <a:prstDash val="solid"/>
-                <a:round/>
-                <a:headEnd type="none" w="med" len="med"/>
-                <a:tailEnd type="triangle" w="med" len="med"/>
-              </a:ln>
-            </p:spPr>
-          </p:cxnSp>
-          <p:cxnSp>
-            <p:nvCxnSpPr>
-              <p:cNvPr id="156" name="Google Shape;156;p16"/>
-              <p:cNvCxnSpPr>
-                <a:stCxn id="137" idx="6"/>
-                <a:endCxn id="144" idx="2"/>
-              </p:cNvCxnSpPr>
-              <p:nvPr/>
-            </p:nvCxnSpPr>
-            <p:spPr>
-              <a:xfrm>
-                <a:off x="2651450" y="2307644"/>
-                <a:ext cx="1622100" cy="292500"/>
-              </a:xfrm>
-              <a:prstGeom prst="straightConnector1">
-                <a:avLst/>
-              </a:prstGeom>
-              <a:noFill/>
-              <a:ln w="19050" cap="flat" cmpd="sng">
-                <a:solidFill>
-                  <a:srgbClr val="CCCCCC"/>
-                </a:solidFill>
-                <a:prstDash val="solid"/>
-                <a:round/>
-                <a:headEnd type="none" w="med" len="med"/>
-                <a:tailEnd type="triangle" w="med" len="med"/>
-              </a:ln>
-            </p:spPr>
-          </p:cxnSp>
-          <p:cxnSp>
-            <p:nvCxnSpPr>
-              <p:cNvPr id="157" name="Google Shape;157;p16"/>
-              <p:cNvCxnSpPr>
-                <a:stCxn id="138" idx="6"/>
-                <a:endCxn id="141" idx="2"/>
-              </p:cNvCxnSpPr>
-              <p:nvPr/>
-            </p:nvCxnSpPr>
-            <p:spPr>
-              <a:xfrm rot="10800000" flipH="1">
-                <a:off x="2651450" y="1857044"/>
-                <a:ext cx="1622100" cy="1169100"/>
-              </a:xfrm>
-              <a:prstGeom prst="straightConnector1">
-                <a:avLst/>
-              </a:prstGeom>
-              <a:noFill/>
-              <a:ln w="19050" cap="flat" cmpd="sng">
-                <a:solidFill>
-                  <a:schemeClr val="tx1"/>
-                </a:solidFill>
-                <a:prstDash val="solid"/>
-                <a:round/>
-                <a:headEnd type="none" w="med" len="med"/>
-                <a:tailEnd type="triangle" w="med" len="med"/>
-              </a:ln>
-            </p:spPr>
-          </p:cxnSp>
-          <p:cxnSp>
-            <p:nvCxnSpPr>
-              <p:cNvPr id="158" name="Google Shape;158;p16"/>
-              <p:cNvCxnSpPr>
-                <a:stCxn id="137" idx="6"/>
-                <a:endCxn id="150" idx="2"/>
-              </p:cNvCxnSpPr>
-              <p:nvPr/>
-            </p:nvCxnSpPr>
-            <p:spPr>
-              <a:xfrm>
-                <a:off x="2651450" y="2307644"/>
-                <a:ext cx="1622100" cy="1778700"/>
-              </a:xfrm>
-              <a:prstGeom prst="straightConnector1">
-                <a:avLst/>
-              </a:prstGeom>
-              <a:noFill/>
-              <a:ln w="19050" cap="flat" cmpd="sng">
-                <a:solidFill>
-                  <a:srgbClr val="CCCCCC"/>
-                </a:solidFill>
-                <a:prstDash val="solid"/>
-                <a:round/>
-                <a:headEnd type="none" w="med" len="med"/>
-                <a:tailEnd type="triangle" w="med" len="med"/>
-              </a:ln>
-            </p:spPr>
-          </p:cxnSp>
-          <p:cxnSp>
-            <p:nvCxnSpPr>
-              <p:cNvPr id="159" name="Google Shape;159;p16"/>
-              <p:cNvCxnSpPr>
-                <a:stCxn id="138" idx="6"/>
-                <a:endCxn id="144" idx="2"/>
-              </p:cNvCxnSpPr>
-              <p:nvPr/>
-            </p:nvCxnSpPr>
-            <p:spPr>
-              <a:xfrm rot="10800000" flipH="1">
-                <a:off x="2651450" y="2600144"/>
-                <a:ext cx="1622100" cy="426000"/>
-              </a:xfrm>
-              <a:prstGeom prst="straightConnector1">
-                <a:avLst/>
-              </a:prstGeom>
-              <a:noFill/>
-              <a:ln w="19050" cap="flat" cmpd="sng">
-                <a:solidFill>
-                  <a:srgbClr val="CCCCCC"/>
-                </a:solidFill>
-                <a:prstDash val="solid"/>
-                <a:round/>
-                <a:headEnd type="none" w="med" len="med"/>
-                <a:tailEnd type="triangle" w="med" len="med"/>
-              </a:ln>
-            </p:spPr>
-          </p:cxnSp>
-          <p:cxnSp>
-            <p:nvCxnSpPr>
-              <p:cNvPr id="160" name="Google Shape;160;p16"/>
-              <p:cNvCxnSpPr>
-                <a:stCxn id="138" idx="6"/>
-                <a:endCxn id="150" idx="2"/>
-              </p:cNvCxnSpPr>
-              <p:nvPr/>
-            </p:nvCxnSpPr>
-            <p:spPr>
-              <a:xfrm>
-                <a:off x="2651450" y="3026144"/>
-                <a:ext cx="1622100" cy="1060200"/>
-              </a:xfrm>
-              <a:prstGeom prst="straightConnector1">
-                <a:avLst/>
-              </a:prstGeom>
-              <a:noFill/>
-              <a:ln w="19050" cap="flat" cmpd="sng">
-                <a:solidFill>
-                  <a:srgbClr val="CCCCCC"/>
-                </a:solidFill>
-                <a:prstDash val="solid"/>
-                <a:round/>
-                <a:headEnd type="none" w="med" len="med"/>
-                <a:tailEnd type="triangle" w="med" len="med"/>
-              </a:ln>
-            </p:spPr>
-          </p:cxnSp>
-          <p:cxnSp>
-            <p:nvCxnSpPr>
-              <p:cNvPr id="161" name="Google Shape;161;p16"/>
-              <p:cNvCxnSpPr>
-                <a:stCxn id="139" idx="6"/>
-                <a:endCxn id="141" idx="2"/>
-              </p:cNvCxnSpPr>
-              <p:nvPr/>
-            </p:nvCxnSpPr>
-            <p:spPr>
-              <a:xfrm rot="10800000" flipH="1">
-                <a:off x="2651450" y="1857044"/>
-                <a:ext cx="1622100" cy="1887600"/>
-              </a:xfrm>
-              <a:prstGeom prst="straightConnector1">
-                <a:avLst/>
-              </a:prstGeom>
-              <a:noFill/>
-              <a:ln w="19050" cap="flat" cmpd="sng">
-                <a:solidFill>
-                  <a:schemeClr val="tx1"/>
-                </a:solidFill>
-                <a:prstDash val="solid"/>
-                <a:round/>
-                <a:headEnd type="none" w="med" len="med"/>
-                <a:tailEnd type="triangle" w="med" len="med"/>
-              </a:ln>
-            </p:spPr>
-          </p:cxnSp>
-          <p:cxnSp>
-            <p:nvCxnSpPr>
-              <p:cNvPr id="162" name="Google Shape;162;p16"/>
-              <p:cNvCxnSpPr>
-                <a:stCxn id="139" idx="6"/>
-                <a:endCxn id="144" idx="2"/>
-              </p:cNvCxnSpPr>
-              <p:nvPr/>
-            </p:nvCxnSpPr>
-            <p:spPr>
-              <a:xfrm rot="10800000" flipH="1">
-                <a:off x="2651450" y="2600144"/>
-                <a:ext cx="1622100" cy="1144500"/>
-              </a:xfrm>
-              <a:prstGeom prst="straightConnector1">
-                <a:avLst/>
-              </a:prstGeom>
-              <a:noFill/>
-              <a:ln w="19050" cap="flat" cmpd="sng">
-                <a:solidFill>
-                  <a:srgbClr val="CCCCCC"/>
-                </a:solidFill>
-                <a:prstDash val="solid"/>
-                <a:round/>
-                <a:headEnd type="none" w="med" len="med"/>
-                <a:tailEnd type="triangle" w="med" len="med"/>
-              </a:ln>
-            </p:spPr>
-          </p:cxnSp>
-          <p:cxnSp>
-            <p:nvCxnSpPr>
-              <p:cNvPr id="163" name="Google Shape;163;p16"/>
-              <p:cNvCxnSpPr>
-                <a:stCxn id="139" idx="6"/>
-                <a:endCxn id="150" idx="2"/>
-              </p:cNvCxnSpPr>
-              <p:nvPr/>
-            </p:nvCxnSpPr>
-            <p:spPr>
-              <a:xfrm>
-                <a:off x="2651450" y="3744644"/>
-                <a:ext cx="1622100" cy="341700"/>
-              </a:xfrm>
-              <a:prstGeom prst="straightConnector1">
-                <a:avLst/>
-              </a:prstGeom>
-              <a:noFill/>
-              <a:ln w="19050" cap="flat" cmpd="sng">
-                <a:solidFill>
-                  <a:srgbClr val="CCCCCC"/>
-                </a:solidFill>
-                <a:prstDash val="solid"/>
-                <a:round/>
-                <a:headEnd type="none" w="med" len="med"/>
-                <a:tailEnd type="triangle" w="med" len="med"/>
-              </a:ln>
-            </p:spPr>
-          </p:cxnSp>
-          <p:cxnSp>
-            <p:nvCxnSpPr>
-              <p:cNvPr id="164" name="Google Shape;164;p16"/>
-              <p:cNvCxnSpPr>
-                <a:stCxn id="139" idx="6"/>
-                <a:endCxn id="147" idx="2"/>
-              </p:cNvCxnSpPr>
-              <p:nvPr/>
-            </p:nvCxnSpPr>
-            <p:spPr>
-              <a:xfrm rot="10800000" flipH="1">
-                <a:off x="2651450" y="3343244"/>
-                <a:ext cx="1622100" cy="401400"/>
-              </a:xfrm>
-              <a:prstGeom prst="straightConnector1">
-                <a:avLst/>
-              </a:prstGeom>
-              <a:noFill/>
-              <a:ln w="19050" cap="flat" cmpd="sng">
-                <a:solidFill>
-                  <a:srgbClr val="CCCCCC"/>
-                </a:solidFill>
-                <a:prstDash val="solid"/>
-                <a:round/>
-                <a:headEnd type="none" w="med" len="med"/>
-                <a:tailEnd type="triangle" w="med" len="med"/>
-              </a:ln>
-            </p:spPr>
-          </p:cxnSp>
-          <p:cxnSp>
-            <p:nvCxnSpPr>
-              <p:cNvPr id="165" name="Google Shape;165;p16"/>
-              <p:cNvCxnSpPr>
-                <a:stCxn id="138" idx="6"/>
-                <a:endCxn id="147" idx="2"/>
-              </p:cNvCxnSpPr>
-              <p:nvPr/>
-            </p:nvCxnSpPr>
-            <p:spPr>
-              <a:xfrm>
-                <a:off x="2651450" y="3026144"/>
-                <a:ext cx="1622100" cy="317100"/>
-              </a:xfrm>
-              <a:prstGeom prst="straightConnector1">
-                <a:avLst/>
-              </a:prstGeom>
-              <a:noFill/>
-              <a:ln w="19050" cap="flat" cmpd="sng">
-                <a:solidFill>
-                  <a:srgbClr val="CCCCCC"/>
-                </a:solidFill>
-                <a:prstDash val="solid"/>
-                <a:round/>
-                <a:headEnd type="none" w="med" len="med"/>
-                <a:tailEnd type="triangle" w="med" len="med"/>
-              </a:ln>
-            </p:spPr>
-          </p:cxnSp>
-          <p:cxnSp>
-            <p:nvCxnSpPr>
-              <p:cNvPr id="166" name="Google Shape;166;p16"/>
-              <p:cNvCxnSpPr>
-                <a:stCxn id="137" idx="6"/>
-                <a:endCxn id="147" idx="2"/>
-              </p:cNvCxnSpPr>
-              <p:nvPr/>
-            </p:nvCxnSpPr>
-            <p:spPr>
-              <a:xfrm>
-                <a:off x="2651450" y="2307644"/>
-                <a:ext cx="1622100" cy="1035600"/>
-              </a:xfrm>
-              <a:prstGeom prst="straightConnector1">
-                <a:avLst/>
-              </a:prstGeom>
-              <a:noFill/>
-              <a:ln w="19050" cap="flat" cmpd="sng">
-                <a:solidFill>
-                  <a:srgbClr val="CCCCCC"/>
-                </a:solidFill>
-                <a:prstDash val="solid"/>
-                <a:round/>
-                <a:headEnd type="none" w="med" len="med"/>
-                <a:tailEnd type="triangle" w="med" len="med"/>
-              </a:ln>
-            </p:spPr>
-          </p:cxnSp>
-          <p:cxnSp>
-            <p:nvCxnSpPr>
-              <p:cNvPr id="167" name="Google Shape;167;p16"/>
-              <p:cNvCxnSpPr>
-                <a:stCxn id="142" idx="2"/>
-                <a:endCxn id="153" idx="2"/>
-              </p:cNvCxnSpPr>
-              <p:nvPr/>
-            </p:nvCxnSpPr>
-            <p:spPr>
-              <a:xfrm>
-                <a:off x="4874000" y="1856990"/>
-                <a:ext cx="1550700" cy="1169100"/>
-              </a:xfrm>
-              <a:prstGeom prst="straightConnector1">
-                <a:avLst/>
-              </a:prstGeom>
-              <a:noFill/>
-              <a:ln w="19050" cap="flat" cmpd="sng">
-                <a:solidFill>
-                  <a:srgbClr val="CCCCCC"/>
-                </a:solidFill>
-                <a:prstDash val="solid"/>
-                <a:round/>
-                <a:headEnd type="none" w="med" len="med"/>
-                <a:tailEnd type="triangle" w="med" len="med"/>
-              </a:ln>
-            </p:spPr>
-          </p:cxnSp>
-          <p:cxnSp>
-            <p:nvCxnSpPr>
-              <p:cNvPr id="168" name="Google Shape;168;p16"/>
-              <p:cNvCxnSpPr>
-                <a:stCxn id="145" idx="2"/>
-                <a:endCxn id="153" idx="2"/>
-              </p:cNvCxnSpPr>
-              <p:nvPr/>
-            </p:nvCxnSpPr>
-            <p:spPr>
-              <a:xfrm>
-                <a:off x="4874000" y="2600115"/>
-                <a:ext cx="1550700" cy="426000"/>
-              </a:xfrm>
-              <a:prstGeom prst="straightConnector1">
-                <a:avLst/>
-              </a:prstGeom>
-              <a:noFill/>
-              <a:ln w="19050" cap="flat" cmpd="sng">
-                <a:solidFill>
-                  <a:srgbClr val="CCCCCC"/>
-                </a:solidFill>
-                <a:prstDash val="solid"/>
-                <a:round/>
-                <a:headEnd type="none" w="med" len="med"/>
-                <a:tailEnd type="triangle" w="med" len="med"/>
-              </a:ln>
-            </p:spPr>
-          </p:cxnSp>
-          <p:cxnSp>
-            <p:nvCxnSpPr>
-              <p:cNvPr id="169" name="Google Shape;169;p16"/>
-              <p:cNvCxnSpPr>
-                <a:stCxn id="148" idx="2"/>
-                <a:endCxn id="153" idx="2"/>
-              </p:cNvCxnSpPr>
-              <p:nvPr/>
-            </p:nvCxnSpPr>
-            <p:spPr>
-              <a:xfrm rot="10800000" flipH="1">
-                <a:off x="4874000" y="3026140"/>
-                <a:ext cx="1550700" cy="317100"/>
-              </a:xfrm>
-              <a:prstGeom prst="straightConnector1">
-                <a:avLst/>
-              </a:prstGeom>
-              <a:noFill/>
-              <a:ln w="19050" cap="flat" cmpd="sng">
-                <a:solidFill>
-                  <a:srgbClr val="CCCCCC"/>
-                </a:solidFill>
-                <a:prstDash val="solid"/>
-                <a:round/>
-                <a:headEnd type="none" w="med" len="med"/>
-                <a:tailEnd type="triangle" w="med" len="med"/>
-              </a:ln>
-            </p:spPr>
-          </p:cxnSp>
-          <p:cxnSp>
-            <p:nvCxnSpPr>
-              <p:cNvPr id="170" name="Google Shape;170;p16"/>
-              <p:cNvCxnSpPr>
-                <a:stCxn id="151" idx="2"/>
-                <a:endCxn id="153" idx="2"/>
-              </p:cNvCxnSpPr>
-              <p:nvPr/>
-            </p:nvCxnSpPr>
-            <p:spPr>
-              <a:xfrm rot="10800000" flipH="1">
-                <a:off x="4874000" y="3026165"/>
-                <a:ext cx="1550700" cy="1060200"/>
-              </a:xfrm>
-              <a:prstGeom prst="straightConnector1">
-                <a:avLst/>
-              </a:prstGeom>
-              <a:noFill/>
-              <a:ln w="19050" cap="flat" cmpd="sng">
-                <a:solidFill>
-                  <a:srgbClr val="CCCCCC"/>
-                </a:solidFill>
-                <a:prstDash val="solid"/>
-                <a:round/>
-                <a:headEnd type="none" w="med" len="med"/>
-                <a:tailEnd type="triangle" w="med" len="med"/>
-              </a:ln>
-            </p:spPr>
-          </p:cxnSp>
-          <p:grpSp>
-            <p:nvGrpSpPr>
-              <p:cNvPr id="7" name="Group 6">
-                <a:extLst>
-                  <a:ext uri="{FF2B5EF4-FFF2-40B4-BE49-F238E27FC236}">
-                    <a16:creationId xmlns:a16="http://schemas.microsoft.com/office/drawing/2014/main" id="{1FAFFDD4-42D9-D74F-98B6-E21074B0D0A6}"/>
-                  </a:ext>
-                </a:extLst>
-              </p:cNvPr>
-              <p:cNvGrpSpPr/>
-              <p:nvPr/>
-            </p:nvGrpSpPr>
-            <p:grpSpPr>
-              <a:xfrm>
-                <a:off x="1920350" y="995560"/>
-                <a:ext cx="5303300" cy="381700"/>
-                <a:chOff x="1920350" y="756844"/>
-                <a:chExt cx="5303300" cy="381700"/>
-              </a:xfrm>
-            </p:grpSpPr>
-            <p:sp>
-              <p:nvSpPr>
-                <p:cNvPr id="171" name="Google Shape;171;p16"/>
-                <p:cNvSpPr txBox="1"/>
-                <p:nvPr/>
-              </p:nvSpPr>
-              <p:spPr>
-                <a:xfrm>
-                  <a:off x="1920350" y="781544"/>
-                  <a:ext cx="861600" cy="357000"/>
-                </a:xfrm>
-                <a:prstGeom prst="rect">
-                  <a:avLst/>
-                </a:prstGeom>
-                <a:noFill/>
-                <a:ln>
-                  <a:noFill/>
-                </a:ln>
-              </p:spPr>
-              <p:txBody>
-                <a:bodyPr spcFirstLastPara="1" wrap="square" lIns="121900" tIns="121900" rIns="121900" bIns="121900" anchor="t" anchorCtr="0">
-                  <a:noAutofit/>
-                </a:bodyPr>
-                <a:lstStyle/>
-                <a:p>
-                  <a:pPr algn="ctr"/>
-                  <a:r>
-                    <a:rPr lang="en" sz="2267" b="1" dirty="0">
-                      <a:solidFill>
-                        <a:srgbClr val="ECCC24"/>
-                      </a:solidFill>
-                    </a:rPr>
-                    <a:t>Input</a:t>
-                  </a:r>
-                  <a:endParaRPr sz="2267" b="1" dirty="0">
-                    <a:solidFill>
-                      <a:srgbClr val="ECCC24"/>
-                    </a:solidFill>
-                  </a:endParaRPr>
-                </a:p>
-              </p:txBody>
-            </p:sp>
-            <p:sp>
-              <p:nvSpPr>
-                <p:cNvPr id="172" name="Google Shape;172;p16"/>
-                <p:cNvSpPr txBox="1"/>
-                <p:nvPr/>
-              </p:nvSpPr>
-              <p:spPr>
-                <a:xfrm>
-                  <a:off x="4075113" y="756844"/>
-                  <a:ext cx="997200" cy="357000"/>
-                </a:xfrm>
-                <a:prstGeom prst="rect">
-                  <a:avLst/>
-                </a:prstGeom>
-                <a:noFill/>
-                <a:ln>
-                  <a:noFill/>
-                </a:ln>
-              </p:spPr>
-              <p:txBody>
-                <a:bodyPr spcFirstLastPara="1" wrap="square" lIns="121900" tIns="121900" rIns="121900" bIns="121900" anchor="t" anchorCtr="0">
-                  <a:noAutofit/>
-                </a:bodyPr>
-                <a:lstStyle/>
-                <a:p>
-                  <a:pPr algn="ctr"/>
-                  <a:r>
-                    <a:rPr lang="en" sz="2267" b="1" dirty="0">
-                      <a:solidFill>
-                        <a:srgbClr val="45818E"/>
-                      </a:solidFill>
-                    </a:rPr>
-                    <a:t>Hidden</a:t>
-                  </a:r>
-                  <a:endParaRPr sz="2267" b="1" dirty="0">
-                    <a:solidFill>
-                      <a:srgbClr val="45818E"/>
-                    </a:solidFill>
-                  </a:endParaRPr>
-                </a:p>
-              </p:txBody>
-            </p:sp>
-            <p:sp>
-              <p:nvSpPr>
-                <p:cNvPr id="173" name="Google Shape;173;p16"/>
-                <p:cNvSpPr txBox="1"/>
-                <p:nvPr/>
-              </p:nvSpPr>
-              <p:spPr>
-                <a:xfrm>
-                  <a:off x="6226450" y="781544"/>
-                  <a:ext cx="997200" cy="357000"/>
-                </a:xfrm>
-                <a:prstGeom prst="rect">
-                  <a:avLst/>
-                </a:prstGeom>
-                <a:noFill/>
-                <a:ln>
-                  <a:noFill/>
-                </a:ln>
-              </p:spPr>
-              <p:txBody>
-                <a:bodyPr spcFirstLastPara="1" wrap="square" lIns="121900" tIns="121900" rIns="121900" bIns="121900" anchor="t" anchorCtr="0">
-                  <a:noAutofit/>
-                </a:bodyPr>
-                <a:lstStyle/>
-                <a:p>
-                  <a:pPr algn="ctr"/>
-                  <a:r>
-                    <a:rPr lang="en" sz="2267" b="1">
-                      <a:solidFill>
-                        <a:srgbClr val="6AA84F"/>
-                      </a:solidFill>
-                    </a:rPr>
-                    <a:t>Output</a:t>
-                  </a:r>
-                  <a:endParaRPr sz="2267" b="1">
-                    <a:solidFill>
-                      <a:srgbClr val="6AA84F"/>
-                    </a:solidFill>
-                  </a:endParaRPr>
-                </a:p>
-              </p:txBody>
-            </p:sp>
-          </p:grpSp>
+        </p:grpSp>
+        <p:grpSp>
+          <p:nvGrpSpPr>
+            <p:cNvPr id="143" name="Google Shape;143;p16"/>
+            <p:cNvGrpSpPr/>
+            <p:nvPr/>
+          </p:nvGrpSpPr>
+          <p:grpSpPr>
+            <a:xfrm>
+              <a:off x="4273431" y="2299826"/>
+              <a:ext cx="600569" cy="600579"/>
+              <a:chOff x="4861200" y="959925"/>
+              <a:chExt cx="689200" cy="688500"/>
+            </a:xfrm>
+          </p:grpSpPr>
           <p:sp>
             <p:nvSpPr>
-              <p:cNvPr id="3" name="TextBox 2">
-                <a:extLst>
-                  <a:ext uri="{FF2B5EF4-FFF2-40B4-BE49-F238E27FC236}">
-                    <a16:creationId xmlns:a16="http://schemas.microsoft.com/office/drawing/2014/main" id="{2197C99E-BE5E-4246-A549-8F9912AD3712}"/>
-                  </a:ext>
-                </a:extLst>
-              </p:cNvPr>
-              <p:cNvSpPr txBox="1"/>
+              <p:cNvPr id="144" name="Google Shape;144;p16"/>
+              <p:cNvSpPr/>
               <p:nvPr/>
             </p:nvSpPr>
             <p:spPr>
               <a:xfrm>
-                <a:off x="3121036" y="1896042"/>
-                <a:ext cx="347472" cy="253916"/>
+                <a:off x="4861200" y="959925"/>
+                <a:ext cx="689100" cy="688500"/>
               </a:xfrm>
-              <a:prstGeom prst="rect">
-                <a:avLst/>
+              <a:prstGeom prst="pie">
+                <a:avLst>
+                  <a:gd name="adj1" fmla="val 5396744"/>
+                  <a:gd name="adj2" fmla="val 16200000"/>
+                </a:avLst>
               </a:prstGeom>
-              <a:noFill/>
+              <a:solidFill>
+                <a:srgbClr val="A2C4C9"/>
+              </a:solidFill>
+              <a:ln>
+                <a:noFill/>
+              </a:ln>
             </p:spPr>
             <p:txBody>
-              <a:bodyPr wrap="square" rtlCol="0">
-                <a:spAutoFit/>
+              <a:bodyPr spcFirstLastPara="1" wrap="square" lIns="121900" tIns="121900" rIns="121900" bIns="121900" anchor="ctr" anchorCtr="0">
+                <a:noAutofit/>
               </a:bodyPr>
               <a:lstStyle/>
               <a:p>
-                <a:pPr algn="ctr"/>
-                <a:r>
-                  <a:rPr lang="en-DE" sz="1600" b="1" dirty="0"/>
-                  <a:t>3</a:t>
-                </a:r>
+                <a:endParaRPr sz="2400"/>
               </a:p>
             </p:txBody>
           </p:sp>
           <p:sp>
             <p:nvSpPr>
-              <p:cNvPr id="41" name="TextBox 40">
-                <a:extLst>
-                  <a:ext uri="{FF2B5EF4-FFF2-40B4-BE49-F238E27FC236}">
-                    <a16:creationId xmlns:a16="http://schemas.microsoft.com/office/drawing/2014/main" id="{832AC622-AC06-1A44-8CF6-277D35E345FF}"/>
-                  </a:ext>
-                </a:extLst>
-              </p:cNvPr>
-              <p:cNvSpPr txBox="1"/>
+              <p:cNvPr id="145" name="Google Shape;145;p16"/>
+              <p:cNvSpPr/>
               <p:nvPr/>
             </p:nvSpPr>
             <p:spPr>
-              <a:xfrm>
-                <a:off x="3121036" y="2281183"/>
-                <a:ext cx="347472" cy="253916"/>
+              <a:xfrm rot="10800000">
+                <a:off x="4861300" y="959925"/>
+                <a:ext cx="689100" cy="688500"/>
               </a:xfrm>
-              <a:prstGeom prst="rect">
-                <a:avLst/>
+              <a:prstGeom prst="pie">
+                <a:avLst>
+                  <a:gd name="adj1" fmla="val 5396744"/>
+                  <a:gd name="adj2" fmla="val 16200000"/>
+                </a:avLst>
               </a:prstGeom>
-              <a:noFill/>
+              <a:solidFill>
+                <a:srgbClr val="45818E"/>
+              </a:solidFill>
+              <a:ln>
+                <a:noFill/>
+              </a:ln>
             </p:spPr>
             <p:txBody>
-              <a:bodyPr wrap="square" rtlCol="0">
-                <a:spAutoFit/>
+              <a:bodyPr spcFirstLastPara="1" wrap="square" lIns="121900" tIns="121900" rIns="121900" bIns="121900" anchor="ctr" anchorCtr="0">
+                <a:noAutofit/>
               </a:bodyPr>
               <a:lstStyle/>
               <a:p>
-                <a:pPr algn="ctr"/>
-                <a:r>
-                  <a:rPr lang="en-DE" sz="1600" b="1" dirty="0"/>
-                  <a:t>-9</a:t>
-                </a:r>
-              </a:p>
-            </p:txBody>
-          </p:sp>
-          <p:sp>
-            <p:nvSpPr>
-              <p:cNvPr id="42" name="TextBox 41">
-                <a:extLst>
-                  <a:ext uri="{FF2B5EF4-FFF2-40B4-BE49-F238E27FC236}">
-                    <a16:creationId xmlns:a16="http://schemas.microsoft.com/office/drawing/2014/main" id="{B28B4A8F-A26A-6645-B553-0DDC36F8AC2B}"/>
-                  </a:ext>
-                </a:extLst>
-              </p:cNvPr>
-              <p:cNvSpPr txBox="1"/>
-              <p:nvPr/>
-            </p:nvSpPr>
-            <p:spPr>
-              <a:xfrm>
-                <a:off x="3121036" y="2708546"/>
-                <a:ext cx="347472" cy="253916"/>
-              </a:xfrm>
-              <a:prstGeom prst="rect">
-                <a:avLst/>
-              </a:prstGeom>
-              <a:noFill/>
-            </p:spPr>
-            <p:txBody>
-              <a:bodyPr wrap="square" rtlCol="0">
-                <a:spAutoFit/>
-              </a:bodyPr>
-              <a:lstStyle/>
-              <a:p>
-                <a:pPr algn="ctr"/>
-                <a:r>
-                  <a:rPr lang="en-DE" sz="1600" b="1" dirty="0"/>
-                  <a:t>2</a:t>
-                </a:r>
-              </a:p>
-            </p:txBody>
-          </p:sp>
-          <p:sp>
-            <p:nvSpPr>
-              <p:cNvPr id="43" name="TextBox 42">
-                <a:extLst>
-                  <a:ext uri="{FF2B5EF4-FFF2-40B4-BE49-F238E27FC236}">
-                    <a16:creationId xmlns:a16="http://schemas.microsoft.com/office/drawing/2014/main" id="{1CF8E919-2EC6-6B4A-9C4D-8B8BA324FE7F}"/>
-                  </a:ext>
-                </a:extLst>
-              </p:cNvPr>
-              <p:cNvSpPr txBox="1"/>
-              <p:nvPr/>
-            </p:nvSpPr>
-            <p:spPr>
-              <a:xfrm>
-                <a:off x="2177414" y="2161326"/>
-                <a:ext cx="347472" cy="253916"/>
-              </a:xfrm>
-              <a:prstGeom prst="rect">
-                <a:avLst/>
-              </a:prstGeom>
-              <a:noFill/>
-            </p:spPr>
-            <p:txBody>
-              <a:bodyPr wrap="square" rtlCol="0">
-                <a:spAutoFit/>
-              </a:bodyPr>
-              <a:lstStyle/>
-              <a:p>
-                <a:pPr algn="ctr"/>
-                <a:r>
-                  <a:rPr lang="en-DE" sz="1600" b="1" dirty="0"/>
-                  <a:t>-3</a:t>
-                </a:r>
-              </a:p>
-            </p:txBody>
-          </p:sp>
-          <p:sp>
-            <p:nvSpPr>
-              <p:cNvPr id="44" name="TextBox 43">
-                <a:extLst>
-                  <a:ext uri="{FF2B5EF4-FFF2-40B4-BE49-F238E27FC236}">
-                    <a16:creationId xmlns:a16="http://schemas.microsoft.com/office/drawing/2014/main" id="{143E7FEE-09AD-2846-AB20-4BA3A0EF7462}"/>
-                  </a:ext>
-                </a:extLst>
-              </p:cNvPr>
-              <p:cNvSpPr txBox="1"/>
-              <p:nvPr/>
-            </p:nvSpPr>
-            <p:spPr>
-              <a:xfrm>
-                <a:off x="2177414" y="2900405"/>
-                <a:ext cx="347472" cy="253916"/>
-              </a:xfrm>
-              <a:prstGeom prst="rect">
-                <a:avLst/>
-              </a:prstGeom>
-              <a:noFill/>
-            </p:spPr>
-            <p:txBody>
-              <a:bodyPr wrap="square" rtlCol="0">
-                <a:spAutoFit/>
-              </a:bodyPr>
-              <a:lstStyle/>
-              <a:p>
-                <a:pPr algn="ctr"/>
-                <a:r>
-                  <a:rPr lang="en-DE" sz="1600" b="1" dirty="0"/>
-                  <a:t>1</a:t>
-                </a:r>
-              </a:p>
-            </p:txBody>
-          </p:sp>
-          <p:sp>
-            <p:nvSpPr>
-              <p:cNvPr id="45" name="TextBox 44">
-                <a:extLst>
-                  <a:ext uri="{FF2B5EF4-FFF2-40B4-BE49-F238E27FC236}">
-                    <a16:creationId xmlns:a16="http://schemas.microsoft.com/office/drawing/2014/main" id="{A3A56F70-3290-3E43-AE69-E7188A1BA590}"/>
-                  </a:ext>
-                </a:extLst>
-              </p:cNvPr>
-              <p:cNvSpPr txBox="1"/>
-              <p:nvPr/>
-            </p:nvSpPr>
-            <p:spPr>
-              <a:xfrm>
-                <a:off x="2177414" y="3606144"/>
-                <a:ext cx="347472" cy="253916"/>
-              </a:xfrm>
-              <a:prstGeom prst="rect">
-                <a:avLst/>
-              </a:prstGeom>
-              <a:noFill/>
-            </p:spPr>
-            <p:txBody>
-              <a:bodyPr wrap="square" rtlCol="0">
-                <a:spAutoFit/>
-              </a:bodyPr>
-              <a:lstStyle/>
-              <a:p>
-                <a:pPr algn="ctr"/>
-                <a:r>
-                  <a:rPr lang="en-DE" sz="1600" b="1" dirty="0"/>
-                  <a:t>5</a:t>
-                </a:r>
-              </a:p>
-            </p:txBody>
-          </p:sp>
-          <mc:AlternateContent xmlns:mc="http://schemas.openxmlformats.org/markup-compatibility/2006">
-            <mc:Choice xmlns:a14="http://schemas.microsoft.com/office/drawing/2010/main" Requires="a14">
-              <p:sp>
-                <p:nvSpPr>
-                  <p:cNvPr id="47" name="TextBox 46">
-                    <a:extLst>
-                      <a:ext uri="{FF2B5EF4-FFF2-40B4-BE49-F238E27FC236}">
-                        <a16:creationId xmlns:a16="http://schemas.microsoft.com/office/drawing/2014/main" id="{881A34E2-0EDB-484D-ABD9-2F474F16FD17}"/>
-                      </a:ext>
-                    </a:extLst>
-                  </p:cNvPr>
-                  <p:cNvSpPr txBox="1"/>
-                  <p:nvPr/>
-                </p:nvSpPr>
-                <p:spPr>
-                  <a:xfrm>
-                    <a:off x="4273431" y="1336600"/>
-                    <a:ext cx="600482" cy="223091"/>
-                  </a:xfrm>
-                  <a:prstGeom prst="rect">
-                    <a:avLst/>
-                  </a:prstGeom>
-                  <a:noFill/>
-                </p:spPr>
-                <p:txBody>
-                  <a:bodyPr wrap="square" rtlCol="0">
-                    <a:spAutoFit/>
-                  </a:bodyPr>
-                  <a:lstStyle/>
-                  <a:p>
-                    <a:pPr algn="ctr"/>
-                    <a14:m>
-                      <m:oMathPara xmlns:m="http://schemas.openxmlformats.org/officeDocument/2006/math">
-                        <m:oMathParaPr>
-                          <m:jc m:val="centerGroup"/>
-                        </m:oMathParaPr>
-                        <m:oMath xmlns:m="http://schemas.openxmlformats.org/officeDocument/2006/math">
-                          <m:sSub>
-                            <m:sSubPr>
-                              <m:ctrlPr>
-                                <a:rPr lang="en-US" sz="1333" b="1" i="1">
-                                  <a:latin typeface="Cambria Math" panose="02040503050406030204" pitchFamily="18" charset="0"/>
-                                </a:rPr>
-                              </m:ctrlPr>
-                            </m:sSubPr>
-                            <m:e>
-                              <m:r>
-                                <a:rPr lang="en-US" sz="1333" b="1">
-                                  <a:latin typeface="Cambria Math" panose="02040503050406030204" pitchFamily="18" charset="0"/>
-                                </a:rPr>
-                                <m:t>𝐛</m:t>
-                              </m:r>
-                            </m:e>
-                            <m:sub>
-                              <m:r>
-                                <a:rPr lang="en-US" sz="1333" b="1">
-                                  <a:latin typeface="Cambria Math" panose="02040503050406030204" pitchFamily="18" charset="0"/>
-                                </a:rPr>
-                                <m:t>𝟏</m:t>
-                              </m:r>
-                            </m:sub>
-                          </m:sSub>
-                          <m:r>
-                            <a:rPr lang="en-US" sz="1333" b="1">
-                              <a:latin typeface="Cambria Math" panose="02040503050406030204" pitchFamily="18" charset="0"/>
-                            </a:rPr>
-                            <m:t>=</m:t>
-                          </m:r>
-                          <m:r>
-                            <a:rPr lang="en-US" sz="1333" b="1">
-                              <a:latin typeface="Cambria Math" panose="02040503050406030204" pitchFamily="18" charset="0"/>
-                            </a:rPr>
-                            <m:t>𝟓</m:t>
-                          </m:r>
-                        </m:oMath>
-                      </m:oMathPara>
-                    </a14:m>
-                    <a:endParaRPr lang="en-DE" sz="1333" b="1" dirty="0"/>
-                  </a:p>
-                </p:txBody>
-              </p:sp>
-            </mc:Choice>
-            <mc:Fallback>
-              <p:sp>
-                <p:nvSpPr>
-                  <p:cNvPr id="47" name="TextBox 46">
-                    <a:extLst>
-                      <a:ext uri="{FF2B5EF4-FFF2-40B4-BE49-F238E27FC236}">
-                        <a16:creationId xmlns:a16="http://schemas.microsoft.com/office/drawing/2014/main" id="{881A34E2-0EDB-484D-ABD9-2F474F16FD17}"/>
-                      </a:ext>
-                    </a:extLst>
-                  </p:cNvPr>
-                  <p:cNvSpPr txBox="1">
-                    <a:spLocks noRot="1" noChangeAspect="1" noMove="1" noResize="1" noEditPoints="1" noAdjustHandles="1" noChangeArrowheads="1" noChangeShapeType="1" noTextEdit="1"/>
-                  </p:cNvSpPr>
-                  <p:nvPr/>
-                </p:nvSpPr>
-                <p:spPr>
-                  <a:xfrm>
-                    <a:off x="4273431" y="1336600"/>
-                    <a:ext cx="600482" cy="223091"/>
-                  </a:xfrm>
-                  <a:prstGeom prst="rect">
-                    <a:avLst/>
-                  </a:prstGeom>
-                  <a:blipFill>
-                    <a:blip r:embed="rId3"/>
-                    <a:stretch>
-                      <a:fillRect/>
-                    </a:stretch>
-                  </a:blipFill>
-                </p:spPr>
-                <p:txBody>
-                  <a:bodyPr/>
-                  <a:lstStyle/>
-                  <a:p>
-                    <a:r>
-                      <a:rPr lang="en-DE">
-                        <a:noFill/>
-                      </a:rPr>
-                      <a:t> </a:t>
-                    </a:r>
-                  </a:p>
-                </p:txBody>
-              </p:sp>
-            </mc:Fallback>
-          </mc:AlternateContent>
-          <p:sp>
-            <p:nvSpPr>
-              <p:cNvPr id="51" name="TextBox 50">
-                <a:extLst>
-                  <a:ext uri="{FF2B5EF4-FFF2-40B4-BE49-F238E27FC236}">
-                    <a16:creationId xmlns:a16="http://schemas.microsoft.com/office/drawing/2014/main" id="{ABDE5A71-6895-EC4E-8895-26109218AB22}"/>
-                  </a:ext>
-                </a:extLst>
-              </p:cNvPr>
-              <p:cNvSpPr txBox="1"/>
-              <p:nvPr/>
-            </p:nvSpPr>
-            <p:spPr>
-              <a:xfrm>
-                <a:off x="4273263" y="1681128"/>
-                <a:ext cx="347472" cy="253916"/>
-              </a:xfrm>
-              <a:prstGeom prst="rect">
-                <a:avLst/>
-              </a:prstGeom>
-              <a:noFill/>
-            </p:spPr>
-            <p:txBody>
-              <a:bodyPr wrap="square" rtlCol="0">
-                <a:spAutoFit/>
-              </a:bodyPr>
-              <a:lstStyle/>
-              <a:p>
-                <a:pPr algn="ctr"/>
-                <a:r>
-                  <a:rPr lang="en-DE" sz="1600" b="1" dirty="0"/>
-                  <a:t>-3</a:t>
-                </a:r>
+                <a:endParaRPr sz="2400"/>
               </a:p>
             </p:txBody>
           </p:sp>
         </p:grpSp>
         <p:grpSp>
           <p:nvGrpSpPr>
-            <p:cNvPr id="10" name="Group 9">
+            <p:cNvPr id="146" name="Google Shape;146;p16"/>
+            <p:cNvGrpSpPr/>
+            <p:nvPr/>
+          </p:nvGrpSpPr>
+          <p:grpSpPr>
+            <a:xfrm>
+              <a:off x="4273431" y="3042951"/>
+              <a:ext cx="600569" cy="600579"/>
+              <a:chOff x="4861200" y="959925"/>
+              <a:chExt cx="689200" cy="688500"/>
+            </a:xfrm>
+          </p:grpSpPr>
+          <p:sp>
+            <p:nvSpPr>
+              <p:cNvPr id="147" name="Google Shape;147;p16"/>
+              <p:cNvSpPr/>
+              <p:nvPr/>
+            </p:nvSpPr>
+            <p:spPr>
+              <a:xfrm>
+                <a:off x="4861200" y="959925"/>
+                <a:ext cx="689100" cy="688500"/>
+              </a:xfrm>
+              <a:prstGeom prst="pie">
+                <a:avLst>
+                  <a:gd name="adj1" fmla="val 5396744"/>
+                  <a:gd name="adj2" fmla="val 16200000"/>
+                </a:avLst>
+              </a:prstGeom>
+              <a:solidFill>
+                <a:srgbClr val="A2C4C9"/>
+              </a:solidFill>
+              <a:ln>
+                <a:noFill/>
+              </a:ln>
+            </p:spPr>
+            <p:txBody>
+              <a:bodyPr spcFirstLastPara="1" wrap="square" lIns="121900" tIns="121900" rIns="121900" bIns="121900" anchor="ctr" anchorCtr="0">
+                <a:noAutofit/>
+              </a:bodyPr>
+              <a:lstStyle/>
+              <a:p>
+                <a:endParaRPr sz="2400"/>
+              </a:p>
+            </p:txBody>
+          </p:sp>
+          <p:sp>
+            <p:nvSpPr>
+              <p:cNvPr id="148" name="Google Shape;148;p16"/>
+              <p:cNvSpPr/>
+              <p:nvPr/>
+            </p:nvSpPr>
+            <p:spPr>
+              <a:xfrm rot="10800000">
+                <a:off x="4861300" y="959925"/>
+                <a:ext cx="689100" cy="688500"/>
+              </a:xfrm>
+              <a:prstGeom prst="pie">
+                <a:avLst>
+                  <a:gd name="adj1" fmla="val 5396744"/>
+                  <a:gd name="adj2" fmla="val 16200000"/>
+                </a:avLst>
+              </a:prstGeom>
+              <a:solidFill>
+                <a:srgbClr val="45818E"/>
+              </a:solidFill>
+              <a:ln>
+                <a:noFill/>
+              </a:ln>
+            </p:spPr>
+            <p:txBody>
+              <a:bodyPr spcFirstLastPara="1" wrap="square" lIns="121900" tIns="121900" rIns="121900" bIns="121900" anchor="ctr" anchorCtr="0">
+                <a:noAutofit/>
+              </a:bodyPr>
+              <a:lstStyle/>
+              <a:p>
+                <a:endParaRPr sz="2400"/>
+              </a:p>
+            </p:txBody>
+          </p:sp>
+        </p:grpSp>
+        <p:grpSp>
+          <p:nvGrpSpPr>
+            <p:cNvPr id="149" name="Google Shape;149;p16"/>
+            <p:cNvGrpSpPr/>
+            <p:nvPr/>
+          </p:nvGrpSpPr>
+          <p:grpSpPr>
+            <a:xfrm>
+              <a:off x="4273431" y="3786076"/>
+              <a:ext cx="600569" cy="600579"/>
+              <a:chOff x="4861200" y="959925"/>
+              <a:chExt cx="689200" cy="688500"/>
+            </a:xfrm>
+          </p:grpSpPr>
+          <p:sp>
+            <p:nvSpPr>
+              <p:cNvPr id="150" name="Google Shape;150;p16"/>
+              <p:cNvSpPr/>
+              <p:nvPr/>
+            </p:nvSpPr>
+            <p:spPr>
+              <a:xfrm>
+                <a:off x="4861200" y="959925"/>
+                <a:ext cx="689100" cy="688500"/>
+              </a:xfrm>
+              <a:prstGeom prst="pie">
+                <a:avLst>
+                  <a:gd name="adj1" fmla="val 5396744"/>
+                  <a:gd name="adj2" fmla="val 16200000"/>
+                </a:avLst>
+              </a:prstGeom>
+              <a:solidFill>
+                <a:srgbClr val="A2C4C9"/>
+              </a:solidFill>
+              <a:ln>
+                <a:noFill/>
+              </a:ln>
+            </p:spPr>
+            <p:txBody>
+              <a:bodyPr spcFirstLastPara="1" wrap="square" lIns="121900" tIns="121900" rIns="121900" bIns="121900" anchor="ctr" anchorCtr="0">
+                <a:noAutofit/>
+              </a:bodyPr>
+              <a:lstStyle/>
+              <a:p>
+                <a:endParaRPr sz="2400"/>
+              </a:p>
+            </p:txBody>
+          </p:sp>
+          <p:sp>
+            <p:nvSpPr>
+              <p:cNvPr id="151" name="Google Shape;151;p16"/>
+              <p:cNvSpPr/>
+              <p:nvPr/>
+            </p:nvSpPr>
+            <p:spPr>
+              <a:xfrm rot="10800000">
+                <a:off x="4861300" y="959925"/>
+                <a:ext cx="689100" cy="688500"/>
+              </a:xfrm>
+              <a:prstGeom prst="pie">
+                <a:avLst>
+                  <a:gd name="adj1" fmla="val 5396744"/>
+                  <a:gd name="adj2" fmla="val 16200000"/>
+                </a:avLst>
+              </a:prstGeom>
+              <a:solidFill>
+                <a:srgbClr val="45818E"/>
+              </a:solidFill>
+              <a:ln>
+                <a:noFill/>
+              </a:ln>
+            </p:spPr>
+            <p:txBody>
+              <a:bodyPr spcFirstLastPara="1" wrap="square" lIns="121900" tIns="121900" rIns="121900" bIns="121900" anchor="ctr" anchorCtr="0">
+                <a:noAutofit/>
+              </a:bodyPr>
+              <a:lstStyle/>
+              <a:p>
+                <a:endParaRPr sz="2400"/>
+              </a:p>
+            </p:txBody>
+          </p:sp>
+        </p:grpSp>
+        <p:grpSp>
+          <p:nvGrpSpPr>
+            <p:cNvPr id="152" name="Google Shape;152;p16"/>
+            <p:cNvGrpSpPr/>
+            <p:nvPr/>
+          </p:nvGrpSpPr>
+          <p:grpSpPr>
+            <a:xfrm>
+              <a:off x="6424781" y="2725863"/>
+              <a:ext cx="600569" cy="600579"/>
+              <a:chOff x="4861200" y="959925"/>
+              <a:chExt cx="689200" cy="688500"/>
+            </a:xfrm>
+          </p:grpSpPr>
+          <p:sp>
+            <p:nvSpPr>
+              <p:cNvPr id="153" name="Google Shape;153;p16"/>
+              <p:cNvSpPr/>
+              <p:nvPr/>
+            </p:nvSpPr>
+            <p:spPr>
+              <a:xfrm>
+                <a:off x="4861200" y="959925"/>
+                <a:ext cx="689100" cy="688500"/>
+              </a:xfrm>
+              <a:prstGeom prst="pie">
+                <a:avLst>
+                  <a:gd name="adj1" fmla="val 5396744"/>
+                  <a:gd name="adj2" fmla="val 16200000"/>
+                </a:avLst>
+              </a:prstGeom>
+              <a:solidFill>
+                <a:srgbClr val="B6D7A8"/>
+              </a:solidFill>
+              <a:ln>
+                <a:noFill/>
+              </a:ln>
+            </p:spPr>
+            <p:txBody>
+              <a:bodyPr spcFirstLastPara="1" wrap="square" lIns="121900" tIns="121900" rIns="121900" bIns="121900" anchor="ctr" anchorCtr="0">
+                <a:noAutofit/>
+              </a:bodyPr>
+              <a:lstStyle/>
+              <a:p>
+                <a:endParaRPr sz="2400"/>
+              </a:p>
+            </p:txBody>
+          </p:sp>
+          <p:sp>
+            <p:nvSpPr>
+              <p:cNvPr id="154" name="Google Shape;154;p16"/>
+              <p:cNvSpPr/>
+              <p:nvPr/>
+            </p:nvSpPr>
+            <p:spPr>
+              <a:xfrm rot="10800000">
+                <a:off x="4861300" y="959925"/>
+                <a:ext cx="689100" cy="688500"/>
+              </a:xfrm>
+              <a:prstGeom prst="pie">
+                <a:avLst>
+                  <a:gd name="adj1" fmla="val 5396744"/>
+                  <a:gd name="adj2" fmla="val 16200000"/>
+                </a:avLst>
+              </a:prstGeom>
+              <a:solidFill>
+                <a:srgbClr val="6AA84F"/>
+              </a:solidFill>
+              <a:ln>
+                <a:noFill/>
+              </a:ln>
+            </p:spPr>
+            <p:txBody>
+              <a:bodyPr spcFirstLastPara="1" wrap="square" lIns="121900" tIns="121900" rIns="121900" bIns="121900" anchor="ctr" anchorCtr="0">
+                <a:noAutofit/>
+              </a:bodyPr>
+              <a:lstStyle/>
+              <a:p>
+                <a:endParaRPr sz="2400"/>
+              </a:p>
+            </p:txBody>
+          </p:sp>
+        </p:grpSp>
+        <p:cxnSp>
+          <p:nvCxnSpPr>
+            <p:cNvPr id="155" name="Google Shape;155;p16"/>
+            <p:cNvCxnSpPr>
+              <a:stCxn id="137" idx="6"/>
+              <a:endCxn id="141" idx="2"/>
+            </p:cNvCxnSpPr>
+            <p:nvPr/>
+          </p:nvCxnSpPr>
+          <p:spPr>
+            <a:xfrm rot="10800000" flipH="1">
+              <a:off x="2651450" y="1857044"/>
+              <a:ext cx="1622100" cy="450600"/>
+            </a:xfrm>
+            <a:prstGeom prst="straightConnector1">
+              <a:avLst/>
+            </a:prstGeom>
+            <a:noFill/>
+            <a:ln w="19050" cap="flat" cmpd="sng">
+              <a:solidFill>
+                <a:schemeClr val="tx1"/>
+              </a:solidFill>
+              <a:prstDash val="solid"/>
+              <a:round/>
+              <a:headEnd type="none" w="med" len="med"/>
+              <a:tailEnd type="triangle" w="med" len="med"/>
+            </a:ln>
+          </p:spPr>
+        </p:cxnSp>
+        <p:cxnSp>
+          <p:nvCxnSpPr>
+            <p:cNvPr id="156" name="Google Shape;156;p16"/>
+            <p:cNvCxnSpPr>
+              <a:stCxn id="137" idx="6"/>
+              <a:endCxn id="144" idx="2"/>
+            </p:cNvCxnSpPr>
+            <p:nvPr/>
+          </p:nvCxnSpPr>
+          <p:spPr>
+            <a:xfrm>
+              <a:off x="2651450" y="2307644"/>
+              <a:ext cx="1622100" cy="292500"/>
+            </a:xfrm>
+            <a:prstGeom prst="straightConnector1">
+              <a:avLst/>
+            </a:prstGeom>
+            <a:noFill/>
+            <a:ln w="19050" cap="flat" cmpd="sng">
+              <a:solidFill>
+                <a:srgbClr val="CCCCCC"/>
+              </a:solidFill>
+              <a:prstDash val="solid"/>
+              <a:round/>
+              <a:headEnd type="none" w="med" len="med"/>
+              <a:tailEnd type="triangle" w="med" len="med"/>
+            </a:ln>
+          </p:spPr>
+        </p:cxnSp>
+        <p:cxnSp>
+          <p:nvCxnSpPr>
+            <p:cNvPr id="157" name="Google Shape;157;p16"/>
+            <p:cNvCxnSpPr>
+              <a:stCxn id="138" idx="6"/>
+              <a:endCxn id="141" idx="2"/>
+            </p:cNvCxnSpPr>
+            <p:nvPr/>
+          </p:nvCxnSpPr>
+          <p:spPr>
+            <a:xfrm rot="10800000" flipH="1">
+              <a:off x="2651450" y="1857044"/>
+              <a:ext cx="1622100" cy="1169100"/>
+            </a:xfrm>
+            <a:prstGeom prst="straightConnector1">
+              <a:avLst/>
+            </a:prstGeom>
+            <a:noFill/>
+            <a:ln w="19050" cap="flat" cmpd="sng">
+              <a:solidFill>
+                <a:schemeClr val="tx1"/>
+              </a:solidFill>
+              <a:prstDash val="solid"/>
+              <a:round/>
+              <a:headEnd type="none" w="med" len="med"/>
+              <a:tailEnd type="triangle" w="med" len="med"/>
+            </a:ln>
+          </p:spPr>
+        </p:cxnSp>
+        <p:cxnSp>
+          <p:nvCxnSpPr>
+            <p:cNvPr id="158" name="Google Shape;158;p16"/>
+            <p:cNvCxnSpPr>
+              <a:stCxn id="137" idx="6"/>
+              <a:endCxn id="150" idx="2"/>
+            </p:cNvCxnSpPr>
+            <p:nvPr/>
+          </p:nvCxnSpPr>
+          <p:spPr>
+            <a:xfrm>
+              <a:off x="2651450" y="2307644"/>
+              <a:ext cx="1622100" cy="1778700"/>
+            </a:xfrm>
+            <a:prstGeom prst="straightConnector1">
+              <a:avLst/>
+            </a:prstGeom>
+            <a:noFill/>
+            <a:ln w="19050" cap="flat" cmpd="sng">
+              <a:solidFill>
+                <a:srgbClr val="CCCCCC"/>
+              </a:solidFill>
+              <a:prstDash val="solid"/>
+              <a:round/>
+              <a:headEnd type="none" w="med" len="med"/>
+              <a:tailEnd type="triangle" w="med" len="med"/>
+            </a:ln>
+          </p:spPr>
+        </p:cxnSp>
+        <p:cxnSp>
+          <p:nvCxnSpPr>
+            <p:cNvPr id="159" name="Google Shape;159;p16"/>
+            <p:cNvCxnSpPr>
+              <a:stCxn id="138" idx="6"/>
+              <a:endCxn id="144" idx="2"/>
+            </p:cNvCxnSpPr>
+            <p:nvPr/>
+          </p:nvCxnSpPr>
+          <p:spPr>
+            <a:xfrm rot="10800000" flipH="1">
+              <a:off x="2651450" y="2600144"/>
+              <a:ext cx="1622100" cy="426000"/>
+            </a:xfrm>
+            <a:prstGeom prst="straightConnector1">
+              <a:avLst/>
+            </a:prstGeom>
+            <a:noFill/>
+            <a:ln w="19050" cap="flat" cmpd="sng">
+              <a:solidFill>
+                <a:srgbClr val="CCCCCC"/>
+              </a:solidFill>
+              <a:prstDash val="solid"/>
+              <a:round/>
+              <a:headEnd type="none" w="med" len="med"/>
+              <a:tailEnd type="triangle" w="med" len="med"/>
+            </a:ln>
+          </p:spPr>
+        </p:cxnSp>
+        <p:cxnSp>
+          <p:nvCxnSpPr>
+            <p:cNvPr id="160" name="Google Shape;160;p16"/>
+            <p:cNvCxnSpPr>
+              <a:stCxn id="138" idx="6"/>
+              <a:endCxn id="150" idx="2"/>
+            </p:cNvCxnSpPr>
+            <p:nvPr/>
+          </p:nvCxnSpPr>
+          <p:spPr>
+            <a:xfrm>
+              <a:off x="2651450" y="3026144"/>
+              <a:ext cx="1622100" cy="1060200"/>
+            </a:xfrm>
+            <a:prstGeom prst="straightConnector1">
+              <a:avLst/>
+            </a:prstGeom>
+            <a:noFill/>
+            <a:ln w="19050" cap="flat" cmpd="sng">
+              <a:solidFill>
+                <a:srgbClr val="CCCCCC"/>
+              </a:solidFill>
+              <a:prstDash val="solid"/>
+              <a:round/>
+              <a:headEnd type="none" w="med" len="med"/>
+              <a:tailEnd type="triangle" w="med" len="med"/>
+            </a:ln>
+          </p:spPr>
+        </p:cxnSp>
+        <p:cxnSp>
+          <p:nvCxnSpPr>
+            <p:cNvPr id="161" name="Google Shape;161;p16"/>
+            <p:cNvCxnSpPr>
+              <a:stCxn id="139" idx="6"/>
+              <a:endCxn id="141" idx="2"/>
+            </p:cNvCxnSpPr>
+            <p:nvPr/>
+          </p:nvCxnSpPr>
+          <p:spPr>
+            <a:xfrm rot="10800000" flipH="1">
+              <a:off x="2651450" y="1857044"/>
+              <a:ext cx="1622100" cy="1887600"/>
+            </a:xfrm>
+            <a:prstGeom prst="straightConnector1">
+              <a:avLst/>
+            </a:prstGeom>
+            <a:noFill/>
+            <a:ln w="19050" cap="flat" cmpd="sng">
+              <a:solidFill>
+                <a:schemeClr val="tx1"/>
+              </a:solidFill>
+              <a:prstDash val="solid"/>
+              <a:round/>
+              <a:headEnd type="none" w="med" len="med"/>
+              <a:tailEnd type="triangle" w="med" len="med"/>
+            </a:ln>
+          </p:spPr>
+        </p:cxnSp>
+        <p:cxnSp>
+          <p:nvCxnSpPr>
+            <p:cNvPr id="162" name="Google Shape;162;p16"/>
+            <p:cNvCxnSpPr>
+              <a:stCxn id="139" idx="6"/>
+              <a:endCxn id="144" idx="2"/>
+            </p:cNvCxnSpPr>
+            <p:nvPr/>
+          </p:nvCxnSpPr>
+          <p:spPr>
+            <a:xfrm rot="10800000" flipH="1">
+              <a:off x="2651450" y="2600144"/>
+              <a:ext cx="1622100" cy="1144500"/>
+            </a:xfrm>
+            <a:prstGeom prst="straightConnector1">
+              <a:avLst/>
+            </a:prstGeom>
+            <a:noFill/>
+            <a:ln w="19050" cap="flat" cmpd="sng">
+              <a:solidFill>
+                <a:srgbClr val="CCCCCC"/>
+              </a:solidFill>
+              <a:prstDash val="solid"/>
+              <a:round/>
+              <a:headEnd type="none" w="med" len="med"/>
+              <a:tailEnd type="triangle" w="med" len="med"/>
+            </a:ln>
+          </p:spPr>
+        </p:cxnSp>
+        <p:cxnSp>
+          <p:nvCxnSpPr>
+            <p:cNvPr id="163" name="Google Shape;163;p16"/>
+            <p:cNvCxnSpPr>
+              <a:stCxn id="139" idx="6"/>
+              <a:endCxn id="150" idx="2"/>
+            </p:cNvCxnSpPr>
+            <p:nvPr/>
+          </p:nvCxnSpPr>
+          <p:spPr>
+            <a:xfrm>
+              <a:off x="2651450" y="3744644"/>
+              <a:ext cx="1622100" cy="341700"/>
+            </a:xfrm>
+            <a:prstGeom prst="straightConnector1">
+              <a:avLst/>
+            </a:prstGeom>
+            <a:noFill/>
+            <a:ln w="19050" cap="flat" cmpd="sng">
+              <a:solidFill>
+                <a:srgbClr val="CCCCCC"/>
+              </a:solidFill>
+              <a:prstDash val="solid"/>
+              <a:round/>
+              <a:headEnd type="none" w="med" len="med"/>
+              <a:tailEnd type="triangle" w="med" len="med"/>
+            </a:ln>
+          </p:spPr>
+        </p:cxnSp>
+        <p:cxnSp>
+          <p:nvCxnSpPr>
+            <p:cNvPr id="164" name="Google Shape;164;p16"/>
+            <p:cNvCxnSpPr>
+              <a:stCxn id="139" idx="6"/>
+              <a:endCxn id="147" idx="2"/>
+            </p:cNvCxnSpPr>
+            <p:nvPr/>
+          </p:nvCxnSpPr>
+          <p:spPr>
+            <a:xfrm rot="10800000" flipH="1">
+              <a:off x="2651450" y="3343244"/>
+              <a:ext cx="1622100" cy="401400"/>
+            </a:xfrm>
+            <a:prstGeom prst="straightConnector1">
+              <a:avLst/>
+            </a:prstGeom>
+            <a:noFill/>
+            <a:ln w="19050" cap="flat" cmpd="sng">
+              <a:solidFill>
+                <a:srgbClr val="CCCCCC"/>
+              </a:solidFill>
+              <a:prstDash val="solid"/>
+              <a:round/>
+              <a:headEnd type="none" w="med" len="med"/>
+              <a:tailEnd type="triangle" w="med" len="med"/>
+            </a:ln>
+          </p:spPr>
+        </p:cxnSp>
+        <p:cxnSp>
+          <p:nvCxnSpPr>
+            <p:cNvPr id="165" name="Google Shape;165;p16"/>
+            <p:cNvCxnSpPr>
+              <a:stCxn id="138" idx="6"/>
+              <a:endCxn id="147" idx="2"/>
+            </p:cNvCxnSpPr>
+            <p:nvPr/>
+          </p:nvCxnSpPr>
+          <p:spPr>
+            <a:xfrm>
+              <a:off x="2651450" y="3026144"/>
+              <a:ext cx="1622100" cy="317100"/>
+            </a:xfrm>
+            <a:prstGeom prst="straightConnector1">
+              <a:avLst/>
+            </a:prstGeom>
+            <a:noFill/>
+            <a:ln w="19050" cap="flat" cmpd="sng">
+              <a:solidFill>
+                <a:srgbClr val="CCCCCC"/>
+              </a:solidFill>
+              <a:prstDash val="solid"/>
+              <a:round/>
+              <a:headEnd type="none" w="med" len="med"/>
+              <a:tailEnd type="triangle" w="med" len="med"/>
+            </a:ln>
+          </p:spPr>
+        </p:cxnSp>
+        <p:cxnSp>
+          <p:nvCxnSpPr>
+            <p:cNvPr id="166" name="Google Shape;166;p16"/>
+            <p:cNvCxnSpPr>
+              <a:stCxn id="137" idx="6"/>
+              <a:endCxn id="147" idx="2"/>
+            </p:cNvCxnSpPr>
+            <p:nvPr/>
+          </p:nvCxnSpPr>
+          <p:spPr>
+            <a:xfrm>
+              <a:off x="2651450" y="2307644"/>
+              <a:ext cx="1622100" cy="1035600"/>
+            </a:xfrm>
+            <a:prstGeom prst="straightConnector1">
+              <a:avLst/>
+            </a:prstGeom>
+            <a:noFill/>
+            <a:ln w="19050" cap="flat" cmpd="sng">
+              <a:solidFill>
+                <a:srgbClr val="CCCCCC"/>
+              </a:solidFill>
+              <a:prstDash val="solid"/>
+              <a:round/>
+              <a:headEnd type="none" w="med" len="med"/>
+              <a:tailEnd type="triangle" w="med" len="med"/>
+            </a:ln>
+          </p:spPr>
+        </p:cxnSp>
+        <p:cxnSp>
+          <p:nvCxnSpPr>
+            <p:cNvPr id="167" name="Google Shape;167;p16"/>
+            <p:cNvCxnSpPr>
+              <a:stCxn id="142" idx="2"/>
+              <a:endCxn id="153" idx="2"/>
+            </p:cNvCxnSpPr>
+            <p:nvPr/>
+          </p:nvCxnSpPr>
+          <p:spPr>
+            <a:xfrm>
+              <a:off x="4874000" y="1856990"/>
+              <a:ext cx="1550700" cy="1169100"/>
+            </a:xfrm>
+            <a:prstGeom prst="straightConnector1">
+              <a:avLst/>
+            </a:prstGeom>
+            <a:noFill/>
+            <a:ln w="19050" cap="flat" cmpd="sng">
+              <a:solidFill>
+                <a:srgbClr val="CCCCCC"/>
+              </a:solidFill>
+              <a:prstDash val="solid"/>
+              <a:round/>
+              <a:headEnd type="none" w="med" len="med"/>
+              <a:tailEnd type="triangle" w="med" len="med"/>
+            </a:ln>
+          </p:spPr>
+        </p:cxnSp>
+        <p:cxnSp>
+          <p:nvCxnSpPr>
+            <p:cNvPr id="168" name="Google Shape;168;p16"/>
+            <p:cNvCxnSpPr>
+              <a:stCxn id="145" idx="2"/>
+              <a:endCxn id="153" idx="2"/>
+            </p:cNvCxnSpPr>
+            <p:nvPr/>
+          </p:nvCxnSpPr>
+          <p:spPr>
+            <a:xfrm>
+              <a:off x="4874000" y="2600115"/>
+              <a:ext cx="1550700" cy="426000"/>
+            </a:xfrm>
+            <a:prstGeom prst="straightConnector1">
+              <a:avLst/>
+            </a:prstGeom>
+            <a:noFill/>
+            <a:ln w="19050" cap="flat" cmpd="sng">
+              <a:solidFill>
+                <a:srgbClr val="CCCCCC"/>
+              </a:solidFill>
+              <a:prstDash val="solid"/>
+              <a:round/>
+              <a:headEnd type="none" w="med" len="med"/>
+              <a:tailEnd type="triangle" w="med" len="med"/>
+            </a:ln>
+          </p:spPr>
+        </p:cxnSp>
+        <p:cxnSp>
+          <p:nvCxnSpPr>
+            <p:cNvPr id="169" name="Google Shape;169;p16"/>
+            <p:cNvCxnSpPr>
+              <a:stCxn id="148" idx="2"/>
+              <a:endCxn id="153" idx="2"/>
+            </p:cNvCxnSpPr>
+            <p:nvPr/>
+          </p:nvCxnSpPr>
+          <p:spPr>
+            <a:xfrm rot="10800000" flipH="1">
+              <a:off x="4874000" y="3026140"/>
+              <a:ext cx="1550700" cy="317100"/>
+            </a:xfrm>
+            <a:prstGeom prst="straightConnector1">
+              <a:avLst/>
+            </a:prstGeom>
+            <a:noFill/>
+            <a:ln w="19050" cap="flat" cmpd="sng">
+              <a:solidFill>
+                <a:srgbClr val="CCCCCC"/>
+              </a:solidFill>
+              <a:prstDash val="solid"/>
+              <a:round/>
+              <a:headEnd type="none" w="med" len="med"/>
+              <a:tailEnd type="triangle" w="med" len="med"/>
+            </a:ln>
+          </p:spPr>
+        </p:cxnSp>
+        <p:cxnSp>
+          <p:nvCxnSpPr>
+            <p:cNvPr id="170" name="Google Shape;170;p16"/>
+            <p:cNvCxnSpPr>
+              <a:stCxn id="151" idx="2"/>
+              <a:endCxn id="153" idx="2"/>
+            </p:cNvCxnSpPr>
+            <p:nvPr/>
+          </p:nvCxnSpPr>
+          <p:spPr>
+            <a:xfrm rot="10800000" flipH="1">
+              <a:off x="4874000" y="3026165"/>
+              <a:ext cx="1550700" cy="1060200"/>
+            </a:xfrm>
+            <a:prstGeom prst="straightConnector1">
+              <a:avLst/>
+            </a:prstGeom>
+            <a:noFill/>
+            <a:ln w="19050" cap="flat" cmpd="sng">
+              <a:solidFill>
+                <a:srgbClr val="CCCCCC"/>
+              </a:solidFill>
+              <a:prstDash val="solid"/>
+              <a:round/>
+              <a:headEnd type="none" w="med" len="med"/>
+              <a:tailEnd type="triangle" w="med" len="med"/>
+            </a:ln>
+          </p:spPr>
+        </p:cxnSp>
+        <p:grpSp>
+          <p:nvGrpSpPr>
+            <p:cNvPr id="7" name="Group 6">
               <a:extLst>
                 <a:ext uri="{FF2B5EF4-FFF2-40B4-BE49-F238E27FC236}">
-                  <a16:creationId xmlns:a16="http://schemas.microsoft.com/office/drawing/2014/main" id="{74C3FDB6-60CB-C741-BBE2-48962966E441}"/>
+                  <a16:creationId xmlns:a16="http://schemas.microsoft.com/office/drawing/2014/main" id="{1FAFFDD4-42D9-D74F-98B6-E21074B0D0A6}"/>
                 </a:ext>
               </a:extLst>
             </p:cNvPr>
@@ -5717,761 +5175,518 @@
           </p:nvGrpSpPr>
           <p:grpSpPr>
             <a:xfrm>
-              <a:off x="2747164" y="3974256"/>
-              <a:ext cx="3994362" cy="720121"/>
-              <a:chOff x="2747164" y="3974256"/>
-              <a:chExt cx="3994362" cy="720121"/>
+              <a:off x="1920350" y="995560"/>
+              <a:ext cx="5303300" cy="381700"/>
+              <a:chOff x="1920350" y="756844"/>
+              <a:chExt cx="5303300" cy="381700"/>
             </a:xfrm>
           </p:grpSpPr>
-          <mc:AlternateContent xmlns:mc="http://schemas.openxmlformats.org/markup-compatibility/2006">
-            <mc:Choice xmlns:a14="http://schemas.microsoft.com/office/drawing/2010/main" Requires="a14">
-              <p:sp>
-                <p:nvSpPr>
-                  <p:cNvPr id="61" name="TextBox 60">
-                    <a:extLst>
-                      <a:ext uri="{FF2B5EF4-FFF2-40B4-BE49-F238E27FC236}">
-                        <a16:creationId xmlns:a16="http://schemas.microsoft.com/office/drawing/2014/main" id="{318408D1-BEEB-D347-83A0-0C2D53AEA376}"/>
-                      </a:ext>
-                    </a:extLst>
-                  </p:cNvPr>
-                  <p:cNvSpPr txBox="1"/>
-                  <p:nvPr/>
-                </p:nvSpPr>
-                <p:spPr>
-                  <a:xfrm>
-                    <a:off x="2747164" y="4383138"/>
-                    <a:ext cx="3994362" cy="311239"/>
-                  </a:xfrm>
-                  <a:prstGeom prst="rect">
-                    <a:avLst/>
-                  </a:prstGeom>
-                  <a:noFill/>
-                </p:spPr>
-                <p:txBody>
-                  <a:bodyPr wrap="none" lIns="0" tIns="0" rIns="0" bIns="0" rtlCol="0">
-                    <a:spAutoFit/>
-                  </a:bodyPr>
-                  <a:lstStyle/>
-                  <a:p>
-                    <a:pPr/>
-                    <a14:m>
-                      <m:oMathPara xmlns:m="http://schemas.openxmlformats.org/officeDocument/2006/math">
-                        <m:oMathParaPr>
-                          <m:jc m:val="left"/>
-                        </m:oMathParaPr>
-                        <m:oMath xmlns:m="http://schemas.openxmlformats.org/officeDocument/2006/math">
-                          <m:sSubSup>
-                            <m:sSubSupPr>
-                              <m:ctrlPr>
-                                <a:rPr lang="en-US" sz="2133" b="1" i="1">
-                                  <a:latin typeface="Cambria Math" panose="02040503050406030204" pitchFamily="18" charset="0"/>
-                                </a:rPr>
-                              </m:ctrlPr>
-                            </m:sSubSupPr>
-                            <m:e>
-                              <m:r>
-                                <a:rPr lang="en-US" sz="2133" b="1">
-                                  <a:latin typeface="Cambria Math" panose="02040503050406030204" pitchFamily="18" charset="0"/>
-                                </a:rPr>
-                                <m:t>𝐳</m:t>
-                              </m:r>
-                            </m:e>
-                            <m:sub>
-                              <m:r>
-                                <a:rPr lang="en-US" sz="2133" b="1">
-                                  <a:latin typeface="Cambria Math" panose="02040503050406030204" pitchFamily="18" charset="0"/>
-                                </a:rPr>
-                                <m:t>𝐢𝐧</m:t>
-                              </m:r>
-                            </m:sub>
-                            <m:sup>
-                              <m:r>
-                                <a:rPr lang="en-US" sz="2133" b="1">
-                                  <a:latin typeface="Cambria Math" panose="02040503050406030204" pitchFamily="18" charset="0"/>
-                                </a:rPr>
-                                <m:t>(</m:t>
-                              </m:r>
-                              <m:r>
-                                <a:rPr lang="en-US" sz="2133" b="1">
-                                  <a:latin typeface="Cambria Math" panose="02040503050406030204" pitchFamily="18" charset="0"/>
-                                </a:rPr>
-                                <m:t>𝟏</m:t>
-                              </m:r>
-                              <m:r>
-                                <a:rPr lang="en-US" sz="2133" b="1">
-                                  <a:latin typeface="Cambria Math" panose="02040503050406030204" pitchFamily="18" charset="0"/>
-                                </a:rPr>
-                                <m:t>)</m:t>
-                              </m:r>
-                            </m:sup>
-                          </m:sSubSup>
-                          <m:r>
-                            <a:rPr lang="en-US" sz="2133" b="1">
-                              <a:latin typeface="Cambria Math" panose="02040503050406030204" pitchFamily="18" charset="0"/>
-                            </a:rPr>
-                            <m:t>=</m:t>
-                          </m:r>
-                          <m:r>
-                            <a:rPr lang="en-US" sz="2133" b="1">
-                              <a:latin typeface="Cambria Math" panose="02040503050406030204" pitchFamily="18" charset="0"/>
-                            </a:rPr>
-                            <m:t>𝟑</m:t>
-                          </m:r>
-                          <m:r>
-                            <a:rPr lang="en-US" sz="2133" b="1">
-                              <a:latin typeface="Cambria Math" panose="02040503050406030204" pitchFamily="18" charset="0"/>
-                            </a:rPr>
-                            <m:t>∗</m:t>
-                          </m:r>
-                          <m:d>
-                            <m:dPr>
-                              <m:ctrlPr>
-                                <a:rPr lang="en-US" sz="2133" b="1" i="1">
-                                  <a:latin typeface="Cambria Math" panose="02040503050406030204" pitchFamily="18" charset="0"/>
-                                </a:rPr>
-                              </m:ctrlPr>
-                            </m:dPr>
-                            <m:e>
-                              <m:r>
-                                <a:rPr lang="en-US" sz="2133" b="1">
-                                  <a:solidFill>
-                                    <a:srgbClr val="FFC000"/>
-                                  </a:solidFill>
-                                  <a:latin typeface="Cambria Math" panose="02040503050406030204" pitchFamily="18" charset="0"/>
-                                </a:rPr>
-                                <m:t>−</m:t>
-                              </m:r>
-                              <m:r>
-                                <a:rPr lang="en-US" sz="2133" b="1">
-                                  <a:solidFill>
-                                    <a:srgbClr val="FFC000"/>
-                                  </a:solidFill>
-                                  <a:latin typeface="Cambria Math" panose="02040503050406030204" pitchFamily="18" charset="0"/>
-                                </a:rPr>
-                                <m:t>𝟑</m:t>
-                              </m:r>
-                            </m:e>
-                          </m:d>
-                          <m:r>
-                            <a:rPr lang="en-US" sz="2133" b="1">
-                              <a:latin typeface="Cambria Math" panose="02040503050406030204" pitchFamily="18" charset="0"/>
-                            </a:rPr>
-                            <m:t>+</m:t>
-                          </m:r>
-                          <m:d>
-                            <m:dPr>
-                              <m:ctrlPr>
-                                <a:rPr lang="en-US" sz="2133" b="1" i="1">
-                                  <a:latin typeface="Cambria Math" panose="02040503050406030204" pitchFamily="18" charset="0"/>
-                                </a:rPr>
-                              </m:ctrlPr>
-                            </m:dPr>
-                            <m:e>
-                              <m:r>
-                                <a:rPr lang="en-US" sz="2133" b="1">
-                                  <a:latin typeface="Cambria Math" panose="02040503050406030204" pitchFamily="18" charset="0"/>
-                                </a:rPr>
-                                <m:t>−</m:t>
-                              </m:r>
-                              <m:r>
-                                <a:rPr lang="en-US" sz="2133" b="1">
-                                  <a:latin typeface="Cambria Math" panose="02040503050406030204" pitchFamily="18" charset="0"/>
-                                </a:rPr>
-                                <m:t>𝟗</m:t>
-                              </m:r>
-                            </m:e>
-                          </m:d>
-                          <m:r>
-                            <a:rPr lang="en-US" sz="2133" b="1">
-                              <a:latin typeface="Cambria Math" panose="02040503050406030204" pitchFamily="18" charset="0"/>
-                            </a:rPr>
-                            <m:t>∗</m:t>
-                          </m:r>
-                          <m:r>
-                            <a:rPr lang="en-US" sz="2133" b="1">
-                              <a:solidFill>
-                                <a:srgbClr val="FFC000"/>
-                              </a:solidFill>
-                              <a:latin typeface="Cambria Math" panose="02040503050406030204" pitchFamily="18" charset="0"/>
-                            </a:rPr>
-                            <m:t>𝟏</m:t>
-                          </m:r>
-                          <m:r>
-                            <a:rPr lang="en-US" sz="2133" b="1">
-                              <a:latin typeface="Cambria Math" panose="02040503050406030204" pitchFamily="18" charset="0"/>
-                            </a:rPr>
-                            <m:t>+</m:t>
-                          </m:r>
-                          <m:r>
-                            <a:rPr lang="en-US" sz="2133" b="1">
-                              <a:latin typeface="Cambria Math" panose="02040503050406030204" pitchFamily="18" charset="0"/>
-                            </a:rPr>
-                            <m:t>𝟐</m:t>
-                          </m:r>
-                          <m:r>
-                            <a:rPr lang="en-US" sz="2133" b="1">
-                              <a:latin typeface="Cambria Math" panose="02040503050406030204" pitchFamily="18" charset="0"/>
-                            </a:rPr>
-                            <m:t>∗</m:t>
-                          </m:r>
-                          <m:r>
-                            <a:rPr lang="en-US" sz="2133" b="1">
-                              <a:solidFill>
-                                <a:srgbClr val="FFC000"/>
-                              </a:solidFill>
-                              <a:latin typeface="Cambria Math" panose="02040503050406030204" pitchFamily="18" charset="0"/>
-                            </a:rPr>
-                            <m:t>𝟓</m:t>
-                          </m:r>
-                          <m:r>
-                            <a:rPr lang="en-US" sz="2133" b="1">
-                              <a:latin typeface="Cambria Math" panose="02040503050406030204" pitchFamily="18" charset="0"/>
-                            </a:rPr>
-                            <m:t>+</m:t>
-                          </m:r>
-                          <m:r>
-                            <a:rPr lang="en-US" sz="2133" b="1">
-                              <a:latin typeface="Cambria Math" panose="02040503050406030204" pitchFamily="18" charset="0"/>
-                            </a:rPr>
-                            <m:t>𝟓</m:t>
-                          </m:r>
-                          <m:r>
-                            <a:rPr lang="en-US" sz="2133" b="1">
-                              <a:latin typeface="Cambria Math" panose="02040503050406030204" pitchFamily="18" charset="0"/>
-                            </a:rPr>
-                            <m:t>=−</m:t>
-                          </m:r>
-                          <m:r>
-                            <a:rPr lang="en-US" sz="2133" b="1">
-                              <a:latin typeface="Cambria Math" panose="02040503050406030204" pitchFamily="18" charset="0"/>
-                            </a:rPr>
-                            <m:t>𝟑</m:t>
-                          </m:r>
-                        </m:oMath>
-                      </m:oMathPara>
-                    </a14:m>
-                    <a:endParaRPr lang="en-DE" sz="2133" b="1" dirty="0"/>
-                  </a:p>
-                </p:txBody>
-              </p:sp>
-            </mc:Choice>
-            <mc:Fallback>
-              <p:sp>
-                <p:nvSpPr>
-                  <p:cNvPr id="61" name="TextBox 60">
-                    <a:extLst>
-                      <a:ext uri="{FF2B5EF4-FFF2-40B4-BE49-F238E27FC236}">
-                        <a16:creationId xmlns:a16="http://schemas.microsoft.com/office/drawing/2014/main" id="{318408D1-BEEB-D347-83A0-0C2D53AEA376}"/>
-                      </a:ext>
-                    </a:extLst>
-                  </p:cNvPr>
-                  <p:cNvSpPr txBox="1">
-                    <a:spLocks noRot="1" noChangeAspect="1" noMove="1" noResize="1" noEditPoints="1" noAdjustHandles="1" noChangeArrowheads="1" noChangeShapeType="1" noTextEdit="1"/>
-                  </p:cNvSpPr>
-                  <p:nvPr/>
-                </p:nvSpPr>
-                <p:spPr>
-                  <a:xfrm>
-                    <a:off x="2747164" y="4383138"/>
-                    <a:ext cx="3994362" cy="311239"/>
-                  </a:xfrm>
-                  <a:prstGeom prst="rect">
-                    <a:avLst/>
-                  </a:prstGeom>
-                  <a:blipFill>
-                    <a:blip r:embed="rId4"/>
-                    <a:stretch>
-                      <a:fillRect l="-1190" t="-3030" b="-18182"/>
-                    </a:stretch>
-                  </a:blipFill>
-                </p:spPr>
-                <p:txBody>
-                  <a:bodyPr/>
-                  <a:lstStyle/>
-                  <a:p>
-                    <a:r>
-                      <a:rPr lang="en-DE">
-                        <a:noFill/>
-                      </a:rPr>
-                      <a:t> </a:t>
-                    </a:r>
-                  </a:p>
-                </p:txBody>
-              </p:sp>
-            </mc:Fallback>
-          </mc:AlternateContent>
-          <mc:AlternateContent xmlns:mc="http://schemas.openxmlformats.org/markup-compatibility/2006">
-            <mc:Choice xmlns:a14="http://schemas.microsoft.com/office/drawing/2010/main" Requires="a14">
-              <p:sp>
-                <p:nvSpPr>
-                  <p:cNvPr id="62" name="TextBox 61">
-                    <a:extLst>
-                      <a:ext uri="{FF2B5EF4-FFF2-40B4-BE49-F238E27FC236}">
-                        <a16:creationId xmlns:a16="http://schemas.microsoft.com/office/drawing/2014/main" id="{38242DB7-9217-7D4E-8BB1-4F2FB62A772E}"/>
-                      </a:ext>
-                    </a:extLst>
-                  </p:cNvPr>
-                  <p:cNvSpPr txBox="1"/>
-                  <p:nvPr/>
-                </p:nvSpPr>
-                <p:spPr>
-                  <a:xfrm>
-                    <a:off x="2747164" y="3974256"/>
-                    <a:ext cx="3524570" cy="311239"/>
-                  </a:xfrm>
-                  <a:prstGeom prst="rect">
-                    <a:avLst/>
-                  </a:prstGeom>
-                  <a:noFill/>
-                </p:spPr>
-                <p:txBody>
-                  <a:bodyPr wrap="none" lIns="0" tIns="0" rIns="0" bIns="0" rtlCol="0">
-                    <a:spAutoFit/>
-                  </a:bodyPr>
-                  <a:lstStyle/>
-                  <a:p>
-                    <a14:m>
+          <p:sp>
+            <p:nvSpPr>
+              <p:cNvPr id="171" name="Google Shape;171;p16"/>
+              <p:cNvSpPr txBox="1"/>
+              <p:nvPr/>
+            </p:nvSpPr>
+            <p:spPr>
+              <a:xfrm>
+                <a:off x="1920350" y="781544"/>
+                <a:ext cx="861600" cy="357000"/>
+              </a:xfrm>
+              <a:prstGeom prst="rect">
+                <a:avLst/>
+              </a:prstGeom>
+              <a:noFill/>
+              <a:ln>
+                <a:noFill/>
+              </a:ln>
+            </p:spPr>
+            <p:txBody>
+              <a:bodyPr spcFirstLastPara="1" wrap="square" lIns="121900" tIns="121900" rIns="121900" bIns="121900" anchor="t" anchorCtr="0">
+                <a:noAutofit/>
+              </a:bodyPr>
+              <a:lstStyle/>
+              <a:p>
+                <a:pPr algn="ctr"/>
+                <a:r>
+                  <a:rPr lang="en" sz="2267" b="1" dirty="0">
+                    <a:solidFill>
+                      <a:srgbClr val="ECCC24"/>
+                    </a:solidFill>
+                  </a:rPr>
+                  <a:t>Input</a:t>
+                </a:r>
+                <a:endParaRPr sz="2267" b="1" dirty="0">
+                  <a:solidFill>
+                    <a:srgbClr val="ECCC24"/>
+                  </a:solidFill>
+                </a:endParaRPr>
+              </a:p>
+            </p:txBody>
+          </p:sp>
+          <p:sp>
+            <p:nvSpPr>
+              <p:cNvPr id="172" name="Google Shape;172;p16"/>
+              <p:cNvSpPr txBox="1"/>
+              <p:nvPr/>
+            </p:nvSpPr>
+            <p:spPr>
+              <a:xfrm>
+                <a:off x="4075113" y="756844"/>
+                <a:ext cx="997200" cy="357000"/>
+              </a:xfrm>
+              <a:prstGeom prst="rect">
+                <a:avLst/>
+              </a:prstGeom>
+              <a:noFill/>
+              <a:ln>
+                <a:noFill/>
+              </a:ln>
+            </p:spPr>
+            <p:txBody>
+              <a:bodyPr spcFirstLastPara="1" wrap="square" lIns="121900" tIns="121900" rIns="121900" bIns="121900" anchor="t" anchorCtr="0">
+                <a:noAutofit/>
+              </a:bodyPr>
+              <a:lstStyle/>
+              <a:p>
+                <a:pPr algn="ctr"/>
+                <a:r>
+                  <a:rPr lang="en" sz="2267" b="1" dirty="0">
+                    <a:solidFill>
+                      <a:srgbClr val="45818E"/>
+                    </a:solidFill>
+                  </a:rPr>
+                  <a:t>Hidden</a:t>
+                </a:r>
+                <a:endParaRPr sz="2267" b="1" dirty="0">
+                  <a:solidFill>
+                    <a:srgbClr val="45818E"/>
+                  </a:solidFill>
+                </a:endParaRPr>
+              </a:p>
+            </p:txBody>
+          </p:sp>
+          <p:sp>
+            <p:nvSpPr>
+              <p:cNvPr id="173" name="Google Shape;173;p16"/>
+              <p:cNvSpPr txBox="1"/>
+              <p:nvPr/>
+            </p:nvSpPr>
+            <p:spPr>
+              <a:xfrm>
+                <a:off x="6226450" y="781544"/>
+                <a:ext cx="997200" cy="357000"/>
+              </a:xfrm>
+              <a:prstGeom prst="rect">
+                <a:avLst/>
+              </a:prstGeom>
+              <a:noFill/>
+              <a:ln>
+                <a:noFill/>
+              </a:ln>
+            </p:spPr>
+            <p:txBody>
+              <a:bodyPr spcFirstLastPara="1" wrap="square" lIns="121900" tIns="121900" rIns="121900" bIns="121900" anchor="t" anchorCtr="0">
+                <a:noAutofit/>
+              </a:bodyPr>
+              <a:lstStyle/>
+              <a:p>
+                <a:pPr algn="ctr"/>
+                <a:r>
+                  <a:rPr lang="en" sz="2267" b="1">
+                    <a:solidFill>
+                      <a:srgbClr val="6AA84F"/>
+                    </a:solidFill>
+                  </a:rPr>
+                  <a:t>Output</a:t>
+                </a:r>
+                <a:endParaRPr sz="2267" b="1">
+                  <a:solidFill>
+                    <a:srgbClr val="6AA84F"/>
+                  </a:solidFill>
+                </a:endParaRPr>
+              </a:p>
+            </p:txBody>
+          </p:sp>
+        </p:grpSp>
+        <p:sp>
+          <p:nvSpPr>
+            <p:cNvPr id="3" name="TextBox 2">
+              <a:extLst>
+                <a:ext uri="{FF2B5EF4-FFF2-40B4-BE49-F238E27FC236}">
+                  <a16:creationId xmlns:a16="http://schemas.microsoft.com/office/drawing/2014/main" id="{2197C99E-BE5E-4246-A549-8F9912AD3712}"/>
+                </a:ext>
+              </a:extLst>
+            </p:cNvPr>
+            <p:cNvSpPr txBox="1"/>
+            <p:nvPr/>
+          </p:nvSpPr>
+          <p:spPr>
+            <a:xfrm>
+              <a:off x="3121036" y="1896042"/>
+              <a:ext cx="347472" cy="253916"/>
+            </a:xfrm>
+            <a:prstGeom prst="rect">
+              <a:avLst/>
+            </a:prstGeom>
+            <a:noFill/>
+          </p:spPr>
+          <p:txBody>
+            <a:bodyPr wrap="square" rtlCol="0">
+              <a:spAutoFit/>
+            </a:bodyPr>
+            <a:lstStyle/>
+            <a:p>
+              <a:pPr algn="ctr"/>
+              <a:r>
+                <a:rPr lang="en-DE" sz="1600" b="1" dirty="0"/>
+                <a:t>3</a:t>
+              </a:r>
+            </a:p>
+          </p:txBody>
+        </p:sp>
+        <p:sp>
+          <p:nvSpPr>
+            <p:cNvPr id="41" name="TextBox 40">
+              <a:extLst>
+                <a:ext uri="{FF2B5EF4-FFF2-40B4-BE49-F238E27FC236}">
+                  <a16:creationId xmlns:a16="http://schemas.microsoft.com/office/drawing/2014/main" id="{832AC622-AC06-1A44-8CF6-277D35E345FF}"/>
+                </a:ext>
+              </a:extLst>
+            </p:cNvPr>
+            <p:cNvSpPr txBox="1"/>
+            <p:nvPr/>
+          </p:nvSpPr>
+          <p:spPr>
+            <a:xfrm>
+              <a:off x="3121036" y="2281183"/>
+              <a:ext cx="347472" cy="253916"/>
+            </a:xfrm>
+            <a:prstGeom prst="rect">
+              <a:avLst/>
+            </a:prstGeom>
+            <a:noFill/>
+          </p:spPr>
+          <p:txBody>
+            <a:bodyPr wrap="square" rtlCol="0">
+              <a:spAutoFit/>
+            </a:bodyPr>
+            <a:lstStyle/>
+            <a:p>
+              <a:pPr algn="ctr"/>
+              <a:r>
+                <a:rPr lang="en-DE" sz="1600" b="1" dirty="0"/>
+                <a:t>-9</a:t>
+              </a:r>
+            </a:p>
+          </p:txBody>
+        </p:sp>
+        <p:sp>
+          <p:nvSpPr>
+            <p:cNvPr id="42" name="TextBox 41">
+              <a:extLst>
+                <a:ext uri="{FF2B5EF4-FFF2-40B4-BE49-F238E27FC236}">
+                  <a16:creationId xmlns:a16="http://schemas.microsoft.com/office/drawing/2014/main" id="{B28B4A8F-A26A-6645-B553-0DDC36F8AC2B}"/>
+                </a:ext>
+              </a:extLst>
+            </p:cNvPr>
+            <p:cNvSpPr txBox="1"/>
+            <p:nvPr/>
+          </p:nvSpPr>
+          <p:spPr>
+            <a:xfrm>
+              <a:off x="3121036" y="2708546"/>
+              <a:ext cx="347472" cy="253916"/>
+            </a:xfrm>
+            <a:prstGeom prst="rect">
+              <a:avLst/>
+            </a:prstGeom>
+            <a:noFill/>
+          </p:spPr>
+          <p:txBody>
+            <a:bodyPr wrap="square" rtlCol="0">
+              <a:spAutoFit/>
+            </a:bodyPr>
+            <a:lstStyle/>
+            <a:p>
+              <a:pPr algn="ctr"/>
+              <a:r>
+                <a:rPr lang="en-DE" sz="1600" b="1" dirty="0"/>
+                <a:t>2</a:t>
+              </a:r>
+            </a:p>
+          </p:txBody>
+        </p:sp>
+        <p:sp>
+          <p:nvSpPr>
+            <p:cNvPr id="43" name="TextBox 42">
+              <a:extLst>
+                <a:ext uri="{FF2B5EF4-FFF2-40B4-BE49-F238E27FC236}">
+                  <a16:creationId xmlns:a16="http://schemas.microsoft.com/office/drawing/2014/main" id="{1CF8E919-2EC6-6B4A-9C4D-8B8BA324FE7F}"/>
+                </a:ext>
+              </a:extLst>
+            </p:cNvPr>
+            <p:cNvSpPr txBox="1"/>
+            <p:nvPr/>
+          </p:nvSpPr>
+          <p:spPr>
+            <a:xfrm>
+              <a:off x="2177414" y="2161326"/>
+              <a:ext cx="347472" cy="253916"/>
+            </a:xfrm>
+            <a:prstGeom prst="rect">
+              <a:avLst/>
+            </a:prstGeom>
+            <a:noFill/>
+          </p:spPr>
+          <p:txBody>
+            <a:bodyPr wrap="square" rtlCol="0">
+              <a:spAutoFit/>
+            </a:bodyPr>
+            <a:lstStyle/>
+            <a:p>
+              <a:pPr algn="ctr"/>
+              <a:r>
+                <a:rPr lang="en-DE" sz="1600" b="1" dirty="0"/>
+                <a:t>-3</a:t>
+              </a:r>
+            </a:p>
+          </p:txBody>
+        </p:sp>
+        <p:sp>
+          <p:nvSpPr>
+            <p:cNvPr id="44" name="TextBox 43">
+              <a:extLst>
+                <a:ext uri="{FF2B5EF4-FFF2-40B4-BE49-F238E27FC236}">
+                  <a16:creationId xmlns:a16="http://schemas.microsoft.com/office/drawing/2014/main" id="{143E7FEE-09AD-2846-AB20-4BA3A0EF7462}"/>
+                </a:ext>
+              </a:extLst>
+            </p:cNvPr>
+            <p:cNvSpPr txBox="1"/>
+            <p:nvPr/>
+          </p:nvSpPr>
+          <p:spPr>
+            <a:xfrm>
+              <a:off x="2177414" y="2900405"/>
+              <a:ext cx="347472" cy="253916"/>
+            </a:xfrm>
+            <a:prstGeom prst="rect">
+              <a:avLst/>
+            </a:prstGeom>
+            <a:noFill/>
+          </p:spPr>
+          <p:txBody>
+            <a:bodyPr wrap="square" rtlCol="0">
+              <a:spAutoFit/>
+            </a:bodyPr>
+            <a:lstStyle/>
+            <a:p>
+              <a:pPr algn="ctr"/>
+              <a:r>
+                <a:rPr lang="en-DE" sz="1600" b="1" dirty="0"/>
+                <a:t>1</a:t>
+              </a:r>
+            </a:p>
+          </p:txBody>
+        </p:sp>
+        <p:sp>
+          <p:nvSpPr>
+            <p:cNvPr id="45" name="TextBox 44">
+              <a:extLst>
+                <a:ext uri="{FF2B5EF4-FFF2-40B4-BE49-F238E27FC236}">
+                  <a16:creationId xmlns:a16="http://schemas.microsoft.com/office/drawing/2014/main" id="{A3A56F70-3290-3E43-AE69-E7188A1BA590}"/>
+                </a:ext>
+              </a:extLst>
+            </p:cNvPr>
+            <p:cNvSpPr txBox="1"/>
+            <p:nvPr/>
+          </p:nvSpPr>
+          <p:spPr>
+            <a:xfrm>
+              <a:off x="2177414" y="3606144"/>
+              <a:ext cx="347472" cy="253916"/>
+            </a:xfrm>
+            <a:prstGeom prst="rect">
+              <a:avLst/>
+            </a:prstGeom>
+            <a:noFill/>
+          </p:spPr>
+          <p:txBody>
+            <a:bodyPr wrap="square" rtlCol="0">
+              <a:spAutoFit/>
+            </a:bodyPr>
+            <a:lstStyle/>
+            <a:p>
+              <a:pPr algn="ctr"/>
+              <a:r>
+                <a:rPr lang="en-DE" sz="1600" b="1" dirty="0"/>
+                <a:t>5</a:t>
+              </a:r>
+            </a:p>
+          </p:txBody>
+        </p:sp>
+        <mc:AlternateContent xmlns:mc="http://schemas.openxmlformats.org/markup-compatibility/2006" xmlns:a14="http://schemas.microsoft.com/office/drawing/2010/main">
+          <mc:Choice Requires="a14">
+            <p:sp>
+              <p:nvSpPr>
+                <p:cNvPr id="47" name="TextBox 46">
+                  <a:extLst>
+                    <a:ext uri="{FF2B5EF4-FFF2-40B4-BE49-F238E27FC236}">
+                      <a16:creationId xmlns:a16="http://schemas.microsoft.com/office/drawing/2014/main" id="{881A34E2-0EDB-484D-ABD9-2F474F16FD17}"/>
+                    </a:ext>
+                  </a:extLst>
+                </p:cNvPr>
+                <p:cNvSpPr txBox="1"/>
+                <p:nvPr/>
+              </p:nvSpPr>
+              <p:spPr>
+                <a:xfrm>
+                  <a:off x="4273431" y="1336600"/>
+                  <a:ext cx="600482" cy="223091"/>
+                </a:xfrm>
+                <a:prstGeom prst="rect">
+                  <a:avLst/>
+                </a:prstGeom>
+                <a:noFill/>
+              </p:spPr>
+              <p:txBody>
+                <a:bodyPr wrap="square" rtlCol="0">
+                  <a:spAutoFit/>
+                </a:bodyPr>
+                <a:lstStyle/>
+                <a:p>
+                  <a:pPr algn="ctr"/>
+                  <a14:m>
+                    <m:oMathPara xmlns:m="http://schemas.openxmlformats.org/officeDocument/2006/math">
+                      <m:oMathParaPr>
+                        <m:jc m:val="centerGroup"/>
+                      </m:oMathParaPr>
                       <m:oMath xmlns:m="http://schemas.openxmlformats.org/officeDocument/2006/math">
-                        <m:sSubSup>
-                          <m:sSubSupPr>
-                            <m:ctrlPr>
-                              <a:rPr lang="en-US" sz="2133" b="1" i="1">
-                                <a:latin typeface="Cambria Math" panose="02040503050406030204" pitchFamily="18" charset="0"/>
-                                <a:ea typeface="Cambria Math" panose="02040503050406030204" pitchFamily="18" charset="0"/>
-                              </a:rPr>
-                            </m:ctrlPr>
-                          </m:sSubSupPr>
-                          <m:e>
-                            <m:r>
-                              <a:rPr lang="en-US" sz="2133" b="1">
-                                <a:latin typeface="Cambria Math" panose="02040503050406030204" pitchFamily="18" charset="0"/>
-                                <a:ea typeface="Cambria Math" panose="02040503050406030204" pitchFamily="18" charset="0"/>
-                              </a:rPr>
-                              <m:t>𝐳</m:t>
-                            </m:r>
-                          </m:e>
-                          <m:sub>
-                            <m:r>
-                              <a:rPr lang="en-US" sz="2133" b="1">
-                                <a:latin typeface="Cambria Math" panose="02040503050406030204" pitchFamily="18" charset="0"/>
-                                <a:ea typeface="Cambria Math" panose="02040503050406030204" pitchFamily="18" charset="0"/>
-                              </a:rPr>
-                              <m:t>𝐢𝐧</m:t>
-                            </m:r>
-                          </m:sub>
-                          <m:sup>
-                            <m:r>
-                              <a:rPr lang="en-US" sz="2133" b="1">
-                                <a:latin typeface="Cambria Math" panose="02040503050406030204" pitchFamily="18" charset="0"/>
-                                <a:ea typeface="Cambria Math" panose="02040503050406030204" pitchFamily="18" charset="0"/>
-                              </a:rPr>
-                              <m:t>(</m:t>
-                            </m:r>
-                            <m:r>
-                              <a:rPr lang="en-US" sz="2133" b="1">
-                                <a:latin typeface="Cambria Math" panose="02040503050406030204" pitchFamily="18" charset="0"/>
-                                <a:ea typeface="Cambria Math" panose="02040503050406030204" pitchFamily="18" charset="0"/>
-                              </a:rPr>
-                              <m:t>𝟏</m:t>
-                            </m:r>
-                            <m:r>
-                              <a:rPr lang="en-US" sz="2133" b="1">
-                                <a:latin typeface="Cambria Math" panose="02040503050406030204" pitchFamily="18" charset="0"/>
-                                <a:ea typeface="Cambria Math" panose="02040503050406030204" pitchFamily="18" charset="0"/>
-                              </a:rPr>
-                              <m:t>)</m:t>
-                            </m:r>
-                          </m:sup>
-                        </m:sSubSup>
-                        <m:r>
-                          <a:rPr lang="en-US" sz="2133" b="1">
-                            <a:latin typeface="Cambria Math" panose="02040503050406030204" pitchFamily="18" charset="0"/>
-                            <a:ea typeface="Cambria Math" panose="02040503050406030204" pitchFamily="18" charset="0"/>
-                          </a:rPr>
-                          <m:t>=</m:t>
-                        </m:r>
                         <m:sSub>
                           <m:sSubPr>
                             <m:ctrlPr>
-                              <a:rPr lang="en-US" sz="2133" b="1" i="1">
+                              <a:rPr lang="en-US" sz="1333" b="1" i="1">
                                 <a:latin typeface="Cambria Math" panose="02040503050406030204" pitchFamily="18" charset="0"/>
-                                <a:ea typeface="Cambria Math" panose="02040503050406030204" pitchFamily="18" charset="0"/>
                               </a:rPr>
                             </m:ctrlPr>
                           </m:sSubPr>
                           <m:e>
                             <m:r>
-                              <a:rPr lang="en-US" sz="2133" b="1">
+                              <a:rPr lang="en-US" sz="1333" b="1">
                                 <a:latin typeface="Cambria Math" panose="02040503050406030204" pitchFamily="18" charset="0"/>
-                                <a:ea typeface="Cambria Math" panose="02040503050406030204" pitchFamily="18" charset="0"/>
-                              </a:rPr>
-                              <m:t>𝐰</m:t>
-                            </m:r>
-                          </m:e>
-                          <m:sub>
-                            <m:r>
-                              <a:rPr lang="en-US" sz="2133" b="1">
-                                <a:latin typeface="Cambria Math" panose="02040503050406030204" pitchFamily="18" charset="0"/>
-                                <a:ea typeface="Cambria Math" panose="02040503050406030204" pitchFamily="18" charset="0"/>
-                              </a:rPr>
-                              <m:t>𝟏𝟏</m:t>
-                            </m:r>
-                          </m:sub>
-                        </m:sSub>
-                        <m:sSup>
-                          <m:sSupPr>
-                            <m:ctrlPr>
-                              <a:rPr lang="en-US" sz="2133" b="1" i="1">
-                                <a:solidFill>
-                                  <a:srgbClr val="FFC000"/>
-                                </a:solidFill>
-                                <a:latin typeface="Cambria Math" panose="02040503050406030204" pitchFamily="18" charset="0"/>
-                                <a:ea typeface="Cambria Math" panose="02040503050406030204" pitchFamily="18" charset="0"/>
-                              </a:rPr>
-                            </m:ctrlPr>
-                          </m:sSupPr>
-                          <m:e>
-                            <m:r>
-                              <a:rPr lang="en-US" sz="2133" b="1">
-                                <a:solidFill>
-                                  <a:srgbClr val="FFC000"/>
-                                </a:solidFill>
-                                <a:latin typeface="Cambria Math" panose="02040503050406030204" pitchFamily="18" charset="0"/>
-                                <a:ea typeface="Cambria Math" panose="02040503050406030204" pitchFamily="18" charset="0"/>
-                              </a:rPr>
-                              <m:t>𝐱</m:t>
-                            </m:r>
-                          </m:e>
-                          <m:sup>
-                            <m:r>
-                              <a:rPr lang="en-US" sz="2133" b="1">
-                                <a:solidFill>
-                                  <a:srgbClr val="FFC000"/>
-                                </a:solidFill>
-                                <a:latin typeface="Cambria Math" panose="02040503050406030204" pitchFamily="18" charset="0"/>
-                                <a:ea typeface="Cambria Math" panose="02040503050406030204" pitchFamily="18" charset="0"/>
-                              </a:rPr>
-                              <m:t>(</m:t>
-                            </m:r>
-                            <m:r>
-                              <a:rPr lang="en-US" sz="2133" b="1">
-                                <a:solidFill>
-                                  <a:srgbClr val="FFC000"/>
-                                </a:solidFill>
-                                <a:latin typeface="Cambria Math" panose="02040503050406030204" pitchFamily="18" charset="0"/>
-                                <a:ea typeface="Cambria Math" panose="02040503050406030204" pitchFamily="18" charset="0"/>
-                              </a:rPr>
-                              <m:t>𝟏</m:t>
-                            </m:r>
-                            <m:r>
-                              <a:rPr lang="en-US" sz="2133" b="1">
-                                <a:solidFill>
-                                  <a:srgbClr val="FFC000"/>
-                                </a:solidFill>
-                                <a:latin typeface="Cambria Math" panose="02040503050406030204" pitchFamily="18" charset="0"/>
-                                <a:ea typeface="Cambria Math" panose="02040503050406030204" pitchFamily="18" charset="0"/>
-                              </a:rPr>
-                              <m:t>)</m:t>
-                            </m:r>
-                          </m:sup>
-                        </m:sSup>
-                        <m:r>
-                          <a:rPr lang="en-US" sz="2133" b="1">
-                            <a:latin typeface="Cambria Math" panose="02040503050406030204" pitchFamily="18" charset="0"/>
-                            <a:ea typeface="Cambria Math" panose="02040503050406030204" pitchFamily="18" charset="0"/>
-                          </a:rPr>
-                          <m:t>+</m:t>
-                        </m:r>
-                        <m:sSub>
-                          <m:sSubPr>
-                            <m:ctrlPr>
-                              <a:rPr lang="en-US" sz="2133" b="1" i="1">
-                                <a:latin typeface="Cambria Math" panose="02040503050406030204" pitchFamily="18" charset="0"/>
-                                <a:ea typeface="Cambria Math" panose="02040503050406030204" pitchFamily="18" charset="0"/>
-                              </a:rPr>
-                            </m:ctrlPr>
-                          </m:sSubPr>
-                          <m:e>
-                            <m:r>
-                              <a:rPr lang="en-US" sz="2133" b="1">
-                                <a:latin typeface="Cambria Math" panose="02040503050406030204" pitchFamily="18" charset="0"/>
-                                <a:ea typeface="Cambria Math" panose="02040503050406030204" pitchFamily="18" charset="0"/>
-                              </a:rPr>
-                              <m:t>𝐰</m:t>
-                            </m:r>
-                          </m:e>
-                          <m:sub>
-                            <m:r>
-                              <a:rPr lang="en-US" sz="2133" b="1">
-                                <a:latin typeface="Cambria Math" panose="02040503050406030204" pitchFamily="18" charset="0"/>
-                                <a:ea typeface="Cambria Math" panose="02040503050406030204" pitchFamily="18" charset="0"/>
-                              </a:rPr>
-                              <m:t>𝟐𝟏</m:t>
-                            </m:r>
-                          </m:sub>
-                        </m:sSub>
-                        <m:sSup>
-                          <m:sSupPr>
-                            <m:ctrlPr>
-                              <a:rPr lang="en-US" sz="2133" b="1" i="1">
-                                <a:solidFill>
-                                  <a:srgbClr val="FFC000"/>
-                                </a:solidFill>
-                                <a:latin typeface="Cambria Math" panose="02040503050406030204" pitchFamily="18" charset="0"/>
-                                <a:ea typeface="Cambria Math" panose="02040503050406030204" pitchFamily="18" charset="0"/>
-                              </a:rPr>
-                            </m:ctrlPr>
-                          </m:sSupPr>
-                          <m:e>
-                            <m:r>
-                              <a:rPr lang="en-US" sz="2133" b="1">
-                                <a:solidFill>
-                                  <a:srgbClr val="FFC000"/>
-                                </a:solidFill>
-                                <a:latin typeface="Cambria Math" panose="02040503050406030204" pitchFamily="18" charset="0"/>
-                                <a:ea typeface="Cambria Math" panose="02040503050406030204" pitchFamily="18" charset="0"/>
-                              </a:rPr>
-                              <m:t>𝐱</m:t>
-                            </m:r>
-                          </m:e>
-                          <m:sup>
-                            <m:r>
-                              <a:rPr lang="en-US" sz="2133" b="1">
-                                <a:solidFill>
-                                  <a:srgbClr val="FFC000"/>
-                                </a:solidFill>
-                                <a:latin typeface="Cambria Math" panose="02040503050406030204" pitchFamily="18" charset="0"/>
-                                <a:ea typeface="Cambria Math" panose="02040503050406030204" pitchFamily="18" charset="0"/>
-                              </a:rPr>
-                              <m:t>(</m:t>
-                            </m:r>
-                            <m:r>
-                              <a:rPr lang="en-US" sz="2133" b="1">
-                                <a:solidFill>
-                                  <a:srgbClr val="FFC000"/>
-                                </a:solidFill>
-                                <a:latin typeface="Cambria Math" panose="02040503050406030204" pitchFamily="18" charset="0"/>
-                                <a:ea typeface="Cambria Math" panose="02040503050406030204" pitchFamily="18" charset="0"/>
-                              </a:rPr>
-                              <m:t>𝟐</m:t>
-                            </m:r>
-                            <m:r>
-                              <a:rPr lang="en-US" sz="2133" b="1">
-                                <a:solidFill>
-                                  <a:srgbClr val="FFC000"/>
-                                </a:solidFill>
-                                <a:latin typeface="Cambria Math" panose="02040503050406030204" pitchFamily="18" charset="0"/>
-                                <a:ea typeface="Cambria Math" panose="02040503050406030204" pitchFamily="18" charset="0"/>
-                              </a:rPr>
-                              <m:t>)</m:t>
-                            </m:r>
-                          </m:sup>
-                        </m:sSup>
-                      </m:oMath>
-                    </a14:m>
-                    <a:r>
-                      <a:rPr lang="en-DE" sz="2133" b="1" dirty="0">
-                        <a:latin typeface="Cambria Math" panose="02040503050406030204" pitchFamily="18" charset="0"/>
-                        <a:ea typeface="Cambria Math" panose="02040503050406030204" pitchFamily="18" charset="0"/>
-                      </a:rPr>
-                      <a:t>+</a:t>
-                    </a:r>
-                    <a:r>
-                      <a:rPr lang="en-US" sz="2133" b="1" dirty="0">
-                        <a:latin typeface="Cambria Math" panose="02040503050406030204" pitchFamily="18" charset="0"/>
-                        <a:ea typeface="Cambria Math" panose="02040503050406030204" pitchFamily="18" charset="0"/>
-                      </a:rPr>
-                      <a:t> </a:t>
-                    </a:r>
-                    <a14:m>
-                      <m:oMath xmlns:m="http://schemas.openxmlformats.org/officeDocument/2006/math">
-                        <m:sSub>
-                          <m:sSubPr>
-                            <m:ctrlPr>
-                              <a:rPr lang="en-US" sz="2133" b="1" i="1">
-                                <a:latin typeface="Cambria Math" panose="02040503050406030204" pitchFamily="18" charset="0"/>
-                                <a:ea typeface="Cambria Math" panose="02040503050406030204" pitchFamily="18" charset="0"/>
-                              </a:rPr>
-                            </m:ctrlPr>
-                          </m:sSubPr>
-                          <m:e>
-                            <m:r>
-                              <a:rPr lang="en-US" sz="2133" b="1">
-                                <a:latin typeface="Cambria Math" panose="02040503050406030204" pitchFamily="18" charset="0"/>
-                                <a:ea typeface="Cambria Math" panose="02040503050406030204" pitchFamily="18" charset="0"/>
-                              </a:rPr>
-                              <m:t>𝐰</m:t>
-                            </m:r>
-                          </m:e>
-                          <m:sub>
-                            <m:r>
-                              <a:rPr lang="en-US" sz="2133" b="1">
-                                <a:latin typeface="Cambria Math" panose="02040503050406030204" pitchFamily="18" charset="0"/>
-                                <a:ea typeface="Cambria Math" panose="02040503050406030204" pitchFamily="18" charset="0"/>
-                              </a:rPr>
-                              <m:t>𝟑𝟏</m:t>
-                            </m:r>
-                          </m:sub>
-                        </m:sSub>
-                        <m:sSup>
-                          <m:sSupPr>
-                            <m:ctrlPr>
-                              <a:rPr lang="en-US" sz="2133" b="1" i="1">
-                                <a:solidFill>
-                                  <a:srgbClr val="FFC000"/>
-                                </a:solidFill>
-                                <a:latin typeface="Cambria Math" panose="02040503050406030204" pitchFamily="18" charset="0"/>
-                                <a:ea typeface="Cambria Math" panose="02040503050406030204" pitchFamily="18" charset="0"/>
-                              </a:rPr>
-                            </m:ctrlPr>
-                          </m:sSupPr>
-                          <m:e>
-                            <m:r>
-                              <a:rPr lang="en-US" sz="2133" b="1">
-                                <a:solidFill>
-                                  <a:srgbClr val="FFC000"/>
-                                </a:solidFill>
-                                <a:latin typeface="Cambria Math" panose="02040503050406030204" pitchFamily="18" charset="0"/>
-                                <a:ea typeface="Cambria Math" panose="02040503050406030204" pitchFamily="18" charset="0"/>
-                              </a:rPr>
-                              <m:t>𝐱</m:t>
-                            </m:r>
-                          </m:e>
-                          <m:sup>
-                            <m:r>
-                              <a:rPr lang="en-US" sz="2133" b="1">
-                                <a:solidFill>
-                                  <a:srgbClr val="FFC000"/>
-                                </a:solidFill>
-                                <a:latin typeface="Cambria Math" panose="02040503050406030204" pitchFamily="18" charset="0"/>
-                                <a:ea typeface="Cambria Math" panose="02040503050406030204" pitchFamily="18" charset="0"/>
-                              </a:rPr>
-                              <m:t>(</m:t>
-                            </m:r>
-                            <m:r>
-                              <a:rPr lang="en-US" sz="2133" b="1">
-                                <a:solidFill>
-                                  <a:srgbClr val="FFC000"/>
-                                </a:solidFill>
-                                <a:latin typeface="Cambria Math" panose="02040503050406030204" pitchFamily="18" charset="0"/>
-                                <a:ea typeface="Cambria Math" panose="02040503050406030204" pitchFamily="18" charset="0"/>
-                              </a:rPr>
-                              <m:t>𝟑</m:t>
-                            </m:r>
-                            <m:r>
-                              <a:rPr lang="en-US" sz="2133" b="1">
-                                <a:solidFill>
-                                  <a:srgbClr val="FFC000"/>
-                                </a:solidFill>
-                                <a:latin typeface="Cambria Math" panose="02040503050406030204" pitchFamily="18" charset="0"/>
-                                <a:ea typeface="Cambria Math" panose="02040503050406030204" pitchFamily="18" charset="0"/>
-                              </a:rPr>
-                              <m:t>)</m:t>
-                            </m:r>
-                          </m:sup>
-                        </m:sSup>
-                      </m:oMath>
-                    </a14:m>
-                    <a:r>
-                      <a:rPr lang="en-DE" sz="2133" b="1" dirty="0">
-                        <a:latin typeface="Cambria Math" panose="02040503050406030204" pitchFamily="18" charset="0"/>
-                        <a:ea typeface="Cambria Math" panose="02040503050406030204" pitchFamily="18" charset="0"/>
-                      </a:rPr>
-                      <a:t>+</a:t>
-                    </a:r>
-                    <a:r>
-                      <a:rPr lang="en-US" sz="2133" b="1" dirty="0">
-                        <a:latin typeface="Cambria Math" panose="02040503050406030204" pitchFamily="18" charset="0"/>
-                        <a:ea typeface="Cambria Math" panose="02040503050406030204" pitchFamily="18" charset="0"/>
-                      </a:rPr>
-                      <a:t> </a:t>
-                    </a:r>
-                    <a14:m>
-                      <m:oMath xmlns:m="http://schemas.openxmlformats.org/officeDocument/2006/math">
-                        <m:sSub>
-                          <m:sSubPr>
-                            <m:ctrlPr>
-                              <a:rPr lang="en-US" sz="2133" b="1" i="1">
-                                <a:latin typeface="Cambria Math" panose="02040503050406030204" pitchFamily="18" charset="0"/>
-                                <a:ea typeface="Cambria Math" panose="02040503050406030204" pitchFamily="18" charset="0"/>
-                              </a:rPr>
-                            </m:ctrlPr>
-                          </m:sSubPr>
-                          <m:e>
-                            <m:r>
-                              <a:rPr lang="en-US" sz="2133" b="1">
-                                <a:latin typeface="Cambria Math" panose="02040503050406030204" pitchFamily="18" charset="0"/>
-                                <a:ea typeface="Cambria Math" panose="02040503050406030204" pitchFamily="18" charset="0"/>
                               </a:rPr>
                               <m:t>𝐛</m:t>
                             </m:r>
                           </m:e>
                           <m:sub>
                             <m:r>
-                              <a:rPr lang="en-US" sz="2133" b="1">
+                              <a:rPr lang="en-US" sz="1333" b="1">
                                 <a:latin typeface="Cambria Math" panose="02040503050406030204" pitchFamily="18" charset="0"/>
-                                <a:ea typeface="Cambria Math" panose="02040503050406030204" pitchFamily="18" charset="0"/>
                               </a:rPr>
                               <m:t>𝟏</m:t>
                             </m:r>
                           </m:sub>
                         </m:sSub>
+                        <m:r>
+                          <a:rPr lang="en-US" sz="1333" b="1">
+                            <a:latin typeface="Cambria Math" panose="02040503050406030204" pitchFamily="18" charset="0"/>
+                          </a:rPr>
+                          <m:t>=</m:t>
+                        </m:r>
+                        <m:r>
+                          <a:rPr lang="en-US" sz="1333" b="1">
+                            <a:latin typeface="Cambria Math" panose="02040503050406030204" pitchFamily="18" charset="0"/>
+                          </a:rPr>
+                          <m:t>𝟓</m:t>
+                        </m:r>
                       </m:oMath>
-                    </a14:m>
-                    <a:endParaRPr lang="en-DE" sz="2133" b="1" dirty="0">
-                      <a:latin typeface="Cambria Math" panose="02040503050406030204" pitchFamily="18" charset="0"/>
-                      <a:ea typeface="Cambria Math" panose="02040503050406030204" pitchFamily="18" charset="0"/>
-                    </a:endParaRPr>
-                  </a:p>
-                </p:txBody>
-              </p:sp>
-            </mc:Choice>
-            <mc:Fallback>
-              <p:sp>
-                <p:nvSpPr>
-                  <p:cNvPr id="62" name="TextBox 61">
-                    <a:extLst>
-                      <a:ext uri="{FF2B5EF4-FFF2-40B4-BE49-F238E27FC236}">
-                        <a16:creationId xmlns:a16="http://schemas.microsoft.com/office/drawing/2014/main" id="{38242DB7-9217-7D4E-8BB1-4F2FB62A772E}"/>
-                      </a:ext>
-                    </a:extLst>
-                  </p:cNvPr>
-                  <p:cNvSpPr txBox="1">
-                    <a:spLocks noRot="1" noChangeAspect="1" noMove="1" noResize="1" noEditPoints="1" noAdjustHandles="1" noChangeArrowheads="1" noChangeShapeType="1" noTextEdit="1"/>
-                  </p:cNvSpPr>
-                  <p:nvPr/>
-                </p:nvSpPr>
-                <p:spPr>
-                  <a:xfrm>
-                    <a:off x="2747164" y="3974256"/>
-                    <a:ext cx="3524570" cy="311239"/>
-                  </a:xfrm>
-                  <a:prstGeom prst="rect">
-                    <a:avLst/>
-                  </a:prstGeom>
-                  <a:blipFill>
-                    <a:blip r:embed="rId5"/>
-                    <a:stretch>
-                      <a:fillRect l="-1348" t="-3030" r="-270" b="-39394"/>
-                    </a:stretch>
-                  </a:blipFill>
-                </p:spPr>
-                <p:txBody>
-                  <a:bodyPr/>
-                  <a:lstStyle/>
-                  <a:p>
-                    <a:r>
-                      <a:rPr lang="en-DE">
-                        <a:noFill/>
-                      </a:rPr>
-                      <a:t> </a:t>
-                    </a:r>
-                  </a:p>
-                </p:txBody>
-              </p:sp>
-            </mc:Fallback>
-          </mc:AlternateContent>
-        </p:grpSp>
+                    </m:oMathPara>
+                  </a14:m>
+                  <a:endParaRPr lang="en-DE" sz="1333" b="1" dirty="0"/>
+                </a:p>
+              </p:txBody>
+            </p:sp>
+          </mc:Choice>
+          <mc:Fallback xmlns="">
+            <p:sp>
+              <p:nvSpPr>
+                <p:cNvPr id="47" name="TextBox 46">
+                  <a:extLst>
+                    <a:ext uri="{FF2B5EF4-FFF2-40B4-BE49-F238E27FC236}">
+                      <a16:creationId xmlns:a16="http://schemas.microsoft.com/office/drawing/2014/main" id="{881A34E2-0EDB-484D-ABD9-2F474F16FD17}"/>
+                    </a:ext>
+                  </a:extLst>
+                </p:cNvPr>
+                <p:cNvSpPr txBox="1">
+                  <a:spLocks noRot="1" noChangeAspect="1" noMove="1" noResize="1" noEditPoints="1" noAdjustHandles="1" noChangeArrowheads="1" noChangeShapeType="1" noTextEdit="1"/>
+                </p:cNvSpPr>
+                <p:nvPr/>
+              </p:nvSpPr>
+              <p:spPr>
+                <a:xfrm>
+                  <a:off x="4273431" y="1336600"/>
+                  <a:ext cx="600482" cy="223091"/>
+                </a:xfrm>
+                <a:prstGeom prst="rect">
+                  <a:avLst/>
+                </a:prstGeom>
+                <a:blipFill>
+                  <a:blip r:embed="rId3"/>
+                  <a:stretch>
+                    <a:fillRect/>
+                  </a:stretch>
+                </a:blipFill>
+              </p:spPr>
+              <p:txBody>
+                <a:bodyPr/>
+                <a:lstStyle/>
+                <a:p>
+                  <a:r>
+                    <a:rPr lang="en-DE">
+                      <a:noFill/>
+                    </a:rPr>
+                    <a:t> </a:t>
+                  </a:r>
+                </a:p>
+              </p:txBody>
+            </p:sp>
+          </mc:Fallback>
+        </mc:AlternateContent>
+        <p:sp>
+          <p:nvSpPr>
+            <p:cNvPr id="51" name="TextBox 50">
+              <a:extLst>
+                <a:ext uri="{FF2B5EF4-FFF2-40B4-BE49-F238E27FC236}">
+                  <a16:creationId xmlns:a16="http://schemas.microsoft.com/office/drawing/2014/main" id="{ABDE5A71-6895-EC4E-8895-26109218AB22}"/>
+                </a:ext>
+              </a:extLst>
+            </p:cNvPr>
+            <p:cNvSpPr txBox="1"/>
+            <p:nvPr/>
+          </p:nvSpPr>
+          <p:spPr>
+            <a:xfrm>
+              <a:off x="4273263" y="1681128"/>
+              <a:ext cx="347472" cy="253916"/>
+            </a:xfrm>
+            <a:prstGeom prst="rect">
+              <a:avLst/>
+            </a:prstGeom>
+            <a:noFill/>
+          </p:spPr>
+          <p:txBody>
+            <a:bodyPr wrap="square" rtlCol="0">
+              <a:spAutoFit/>
+            </a:bodyPr>
+            <a:lstStyle/>
+            <a:p>
+              <a:pPr algn="ctr"/>
+              <a:r>
+                <a:rPr lang="en-DE" sz="1600" b="1" dirty="0"/>
+                <a:t>-3</a:t>
+              </a:r>
+            </a:p>
+          </p:txBody>
+        </p:sp>
       </p:grpSp>
     </p:spTree>
     <p:extLst>

</xml_diff>